<commit_message>
Step 4. Cloud Platform: Introduce and AWS
</commit_message>
<xml_diff>
--- a/Step03-Deployment_Automatization_speach.pptx
+++ b/Step03-Deployment_Automatization_speach.pptx
@@ -175,8 +175,7 @@
 <file path=ppt/revisionInfo.xml><?xml version="1.0" encoding="utf-8"?>
 <p1510:revInfo xmlns:a="http://schemas.openxmlformats.org/drawingml/2006/main" xmlns:r="http://schemas.openxmlformats.org/officeDocument/2006/relationships" xmlns:p1510="http://schemas.microsoft.com/office/powerpoint/2015/10/main">
   <p1510:revLst>
-    <p1510:client id="{543CC2C6-7ABF-48C5-8FEB-8FEABF903516}" v="16" dt="2024-01-25T15:39:05.634"/>
-    <p1510:client id="{56332CB3-8148-420A-A659-8047DFDBF6F1}" v="37" dt="2024-01-26T13:08:28.184"/>
+    <p1510:client id="{56332CB3-8148-420A-A659-8047DFDBF6F1}" v="75" dt="2024-01-30T10:37:56.399"/>
   </p1510:revLst>
 </p1510:revInfo>
 </file>
@@ -2933,9 +2932,618 @@
     </pc:docChg>
   </pc:docChgLst>
   <pc:docChgLst>
+    <pc:chgData name="Ihor Aleksandrov" userId="c3051032-6b87-4db2-b257-777a0106fbd9" providerId="ADAL" clId="{EA2B8A7D-3C52-4D81-9662-EF0FB964F7A9}"/>
+    <pc:docChg chg="undo custSel addSld delSld modSld addMainMaster">
+      <pc:chgData name="Ihor Aleksandrov" userId="c3051032-6b87-4db2-b257-777a0106fbd9" providerId="ADAL" clId="{EA2B8A7D-3C52-4D81-9662-EF0FB964F7A9}" dt="2024-01-24T16:33:04.330" v="132" actId="1076"/>
+      <pc:docMkLst>
+        <pc:docMk/>
+      </pc:docMkLst>
+      <pc:sldChg chg="addSp modSp mod">
+        <pc:chgData name="Ihor Aleksandrov" userId="c3051032-6b87-4db2-b257-777a0106fbd9" providerId="ADAL" clId="{EA2B8A7D-3C52-4D81-9662-EF0FB964F7A9}" dt="2024-01-24T16:06:56.557" v="4" actId="1076"/>
+        <pc:sldMkLst>
+          <pc:docMk/>
+          <pc:sldMk cId="3270890867" sldId="257"/>
+        </pc:sldMkLst>
+        <pc:picChg chg="add mod">
+          <ac:chgData name="Ihor Aleksandrov" userId="c3051032-6b87-4db2-b257-777a0106fbd9" providerId="ADAL" clId="{EA2B8A7D-3C52-4D81-9662-EF0FB964F7A9}" dt="2024-01-24T16:06:56.557" v="4" actId="1076"/>
+          <ac:picMkLst>
+            <pc:docMk/>
+            <pc:sldMk cId="3270890867" sldId="257"/>
+            <ac:picMk id="3" creationId="{4E689865-968D-3D93-994B-3AAC3051378B}"/>
+          </ac:picMkLst>
+        </pc:picChg>
+      </pc:sldChg>
+      <pc:sldChg chg="addSp delSp modSp mod">
+        <pc:chgData name="Ihor Aleksandrov" userId="c3051032-6b87-4db2-b257-777a0106fbd9" providerId="ADAL" clId="{EA2B8A7D-3C52-4D81-9662-EF0FB964F7A9}" dt="2024-01-24T16:10:01.112" v="22" actId="21"/>
+        <pc:sldMkLst>
+          <pc:docMk/>
+          <pc:sldMk cId="3417182101" sldId="258"/>
+        </pc:sldMkLst>
+        <pc:spChg chg="add mod">
+          <ac:chgData name="Ihor Aleksandrov" userId="c3051032-6b87-4db2-b257-777a0106fbd9" providerId="ADAL" clId="{EA2B8A7D-3C52-4D81-9662-EF0FB964F7A9}" dt="2024-01-24T16:08:27.998" v="15" actId="14100"/>
+          <ac:spMkLst>
+            <pc:docMk/>
+            <pc:sldMk cId="3417182101" sldId="258"/>
+            <ac:spMk id="5" creationId="{3101D806-403A-F079-818A-1207B8442687}"/>
+          </ac:spMkLst>
+        </pc:spChg>
+        <pc:picChg chg="add mod">
+          <ac:chgData name="Ihor Aleksandrov" userId="c3051032-6b87-4db2-b257-777a0106fbd9" providerId="ADAL" clId="{EA2B8A7D-3C52-4D81-9662-EF0FB964F7A9}" dt="2024-01-24T16:07:17.540" v="7" actId="1076"/>
+          <ac:picMkLst>
+            <pc:docMk/>
+            <pc:sldMk cId="3417182101" sldId="258"/>
+            <ac:picMk id="3" creationId="{73192EE5-F292-E8DF-78BB-C480918593D9}"/>
+          </ac:picMkLst>
+        </pc:picChg>
+        <pc:picChg chg="add del">
+          <ac:chgData name="Ihor Aleksandrov" userId="c3051032-6b87-4db2-b257-777a0106fbd9" providerId="ADAL" clId="{EA2B8A7D-3C52-4D81-9662-EF0FB964F7A9}" dt="2024-01-24T16:10:01.112" v="22" actId="21"/>
+          <ac:picMkLst>
+            <pc:docMk/>
+            <pc:sldMk cId="3417182101" sldId="258"/>
+            <ac:picMk id="6" creationId="{C576D1E6-CE0C-96E3-680F-E1B2C62F8CF7}"/>
+          </ac:picMkLst>
+        </pc:picChg>
+      </pc:sldChg>
+      <pc:sldChg chg="addSp delSp modSp add del mod">
+        <pc:chgData name="Ihor Aleksandrov" userId="c3051032-6b87-4db2-b257-777a0106fbd9" providerId="ADAL" clId="{EA2B8A7D-3C52-4D81-9662-EF0FB964F7A9}" dt="2024-01-24T16:09:34.630" v="18" actId="47"/>
+        <pc:sldMkLst>
+          <pc:docMk/>
+          <pc:sldMk cId="1989911605" sldId="259"/>
+        </pc:sldMkLst>
+        <pc:picChg chg="del">
+          <ac:chgData name="Ihor Aleksandrov" userId="c3051032-6b87-4db2-b257-777a0106fbd9" providerId="ADAL" clId="{EA2B8A7D-3C52-4D81-9662-EF0FB964F7A9}" dt="2024-01-24T16:07:27.525" v="9" actId="478"/>
+          <ac:picMkLst>
+            <pc:docMk/>
+            <pc:sldMk cId="1989911605" sldId="259"/>
+            <ac:picMk id="3" creationId="{73192EE5-F292-E8DF-78BB-C480918593D9}"/>
+          </ac:picMkLst>
+        </pc:picChg>
+        <pc:picChg chg="add del mod">
+          <ac:chgData name="Ihor Aleksandrov" userId="c3051032-6b87-4db2-b257-777a0106fbd9" providerId="ADAL" clId="{EA2B8A7D-3C52-4D81-9662-EF0FB964F7A9}" dt="2024-01-24T16:09:28.758" v="16" actId="21"/>
+          <ac:picMkLst>
+            <pc:docMk/>
+            <pc:sldMk cId="1989911605" sldId="259"/>
+            <ac:picMk id="4" creationId="{9B699F11-38F0-D536-EC59-183316D30A0B}"/>
+          </ac:picMkLst>
+        </pc:picChg>
+      </pc:sldChg>
+      <pc:sldChg chg="addSp delSp modSp add mod">
+        <pc:chgData name="Ihor Aleksandrov" userId="c3051032-6b87-4db2-b257-777a0106fbd9" providerId="ADAL" clId="{EA2B8A7D-3C52-4D81-9662-EF0FB964F7A9}" dt="2024-01-24T16:10:33.240" v="28" actId="14100"/>
+        <pc:sldMkLst>
+          <pc:docMk/>
+          <pc:sldMk cId="2385514391" sldId="259"/>
+        </pc:sldMkLst>
+        <pc:spChg chg="add mod">
+          <ac:chgData name="Ihor Aleksandrov" userId="c3051032-6b87-4db2-b257-777a0106fbd9" providerId="ADAL" clId="{EA2B8A7D-3C52-4D81-9662-EF0FB964F7A9}" dt="2024-01-24T16:10:33.240" v="28" actId="14100"/>
+          <ac:spMkLst>
+            <pc:docMk/>
+            <pc:sldMk cId="2385514391" sldId="259"/>
+            <ac:spMk id="6" creationId="{115DFACF-1AA5-C3DC-C0A7-872F6D553428}"/>
+          </ac:spMkLst>
+        </pc:spChg>
+        <pc:picChg chg="add mod">
+          <ac:chgData name="Ihor Aleksandrov" userId="c3051032-6b87-4db2-b257-777a0106fbd9" providerId="ADAL" clId="{EA2B8A7D-3C52-4D81-9662-EF0FB964F7A9}" dt="2024-01-24T16:10:10.447" v="25" actId="1076"/>
+          <ac:picMkLst>
+            <pc:docMk/>
+            <pc:sldMk cId="2385514391" sldId="259"/>
+            <ac:picMk id="3" creationId="{94771F4B-C97E-4C7E-EE32-62B9CE4843E8}"/>
+          </ac:picMkLst>
+        </pc:picChg>
+        <pc:picChg chg="del">
+          <ac:chgData name="Ihor Aleksandrov" userId="c3051032-6b87-4db2-b257-777a0106fbd9" providerId="ADAL" clId="{EA2B8A7D-3C52-4D81-9662-EF0FB964F7A9}" dt="2024-01-24T16:09:56.379" v="21" actId="478"/>
+          <ac:picMkLst>
+            <pc:docMk/>
+            <pc:sldMk cId="2385514391" sldId="259"/>
+            <ac:picMk id="4" creationId="{385F9644-E8EA-6C22-DF80-DC79BE06769D}"/>
+          </ac:picMkLst>
+        </pc:picChg>
+      </pc:sldChg>
+      <pc:sldChg chg="addSp delSp modSp add mod">
+        <pc:chgData name="Ihor Aleksandrov" userId="c3051032-6b87-4db2-b257-777a0106fbd9" providerId="ADAL" clId="{EA2B8A7D-3C52-4D81-9662-EF0FB964F7A9}" dt="2024-01-24T16:14:38.639" v="41" actId="14100"/>
+        <pc:sldMkLst>
+          <pc:docMk/>
+          <pc:sldMk cId="1272792471" sldId="260"/>
+        </pc:sldMkLst>
+        <pc:spChg chg="add del">
+          <ac:chgData name="Ihor Aleksandrov" userId="c3051032-6b87-4db2-b257-777a0106fbd9" providerId="ADAL" clId="{EA2B8A7D-3C52-4D81-9662-EF0FB964F7A9}" dt="2024-01-24T16:14:31.607" v="38" actId="22"/>
+          <ac:spMkLst>
+            <pc:docMk/>
+            <pc:sldMk cId="1272792471" sldId="260"/>
+            <ac:spMk id="6" creationId="{3FE0DD55-F1FF-817B-C521-E1B38C3903B5}"/>
+          </ac:spMkLst>
+        </pc:spChg>
+        <pc:spChg chg="add mod">
+          <ac:chgData name="Ihor Aleksandrov" userId="c3051032-6b87-4db2-b257-777a0106fbd9" providerId="ADAL" clId="{EA2B8A7D-3C52-4D81-9662-EF0FB964F7A9}" dt="2024-01-24T16:14:38.639" v="41" actId="14100"/>
+          <ac:spMkLst>
+            <pc:docMk/>
+            <pc:sldMk cId="1272792471" sldId="260"/>
+            <ac:spMk id="8" creationId="{962CACC9-F2FB-EAE2-C7FA-A5DDED1544E9}"/>
+          </ac:spMkLst>
+        </pc:spChg>
+        <pc:picChg chg="add mod">
+          <ac:chgData name="Ihor Aleksandrov" userId="c3051032-6b87-4db2-b257-777a0106fbd9" providerId="ADAL" clId="{EA2B8A7D-3C52-4D81-9662-EF0FB964F7A9}" dt="2024-01-24T16:14:21.159" v="36" actId="1076"/>
+          <ac:picMkLst>
+            <pc:docMk/>
+            <pc:sldMk cId="1272792471" sldId="260"/>
+            <ac:picMk id="3" creationId="{1546C464-6844-1963-9CFB-73B9F3FB02A1}"/>
+          </ac:picMkLst>
+        </pc:picChg>
+        <pc:picChg chg="del">
+          <ac:chgData name="Ihor Aleksandrov" userId="c3051032-6b87-4db2-b257-777a0106fbd9" providerId="ADAL" clId="{EA2B8A7D-3C52-4D81-9662-EF0FB964F7A9}" dt="2024-01-24T16:14:01.347" v="31" actId="478"/>
+          <ac:picMkLst>
+            <pc:docMk/>
+            <pc:sldMk cId="1272792471" sldId="260"/>
+            <ac:picMk id="4" creationId="{385F9644-E8EA-6C22-DF80-DC79BE06769D}"/>
+          </ac:picMkLst>
+        </pc:picChg>
+      </pc:sldChg>
+      <pc:sldChg chg="addSp delSp modSp add del mod setBg delDesignElem">
+        <pc:chgData name="Ihor Aleksandrov" userId="c3051032-6b87-4db2-b257-777a0106fbd9" providerId="ADAL" clId="{EA2B8A7D-3C52-4D81-9662-EF0FB964F7A9}" dt="2024-01-24T16:18:02.567" v="53" actId="1076"/>
+        <pc:sldMkLst>
+          <pc:docMk/>
+          <pc:sldMk cId="3278151509" sldId="261"/>
+        </pc:sldMkLst>
+        <pc:spChg chg="mod">
+          <ac:chgData name="Ihor Aleksandrov" userId="c3051032-6b87-4db2-b257-777a0106fbd9" providerId="ADAL" clId="{EA2B8A7D-3C52-4D81-9662-EF0FB964F7A9}" dt="2024-01-24T16:17:36.102" v="47" actId="26606"/>
+          <ac:spMkLst>
+            <pc:docMk/>
+            <pc:sldMk cId="3278151509" sldId="261"/>
+            <ac:spMk id="2" creationId="{53C5D828-9666-E312-B574-9FE965A7D6BE}"/>
+          </ac:spMkLst>
+        </pc:spChg>
+        <pc:spChg chg="add del">
+          <ac:chgData name="Ihor Aleksandrov" userId="c3051032-6b87-4db2-b257-777a0106fbd9" providerId="ADAL" clId="{EA2B8A7D-3C52-4D81-9662-EF0FB964F7A9}" dt="2024-01-24T16:17:57.899" v="51" actId="22"/>
+          <ac:spMkLst>
+            <pc:docMk/>
+            <pc:sldMk cId="3278151509" sldId="261"/>
+            <ac:spMk id="5" creationId="{80C09514-761F-EDD8-1695-BBF5A6E5D9C0}"/>
+          </ac:spMkLst>
+        </pc:spChg>
+        <pc:spChg chg="add mod">
+          <ac:chgData name="Ihor Aleksandrov" userId="c3051032-6b87-4db2-b257-777a0106fbd9" providerId="ADAL" clId="{EA2B8A7D-3C52-4D81-9662-EF0FB964F7A9}" dt="2024-01-24T16:18:02.567" v="53" actId="1076"/>
+          <ac:spMkLst>
+            <pc:docMk/>
+            <pc:sldMk cId="3278151509" sldId="261"/>
+            <ac:spMk id="7" creationId="{01126049-0F88-3BD5-09AE-A83AF81ABE26}"/>
+          </ac:spMkLst>
+        </pc:spChg>
+        <pc:spChg chg="add">
+          <ac:chgData name="Ihor Aleksandrov" userId="c3051032-6b87-4db2-b257-777a0106fbd9" providerId="ADAL" clId="{EA2B8A7D-3C52-4D81-9662-EF0FB964F7A9}" dt="2024-01-24T16:17:36.102" v="47" actId="26606"/>
+          <ac:spMkLst>
+            <pc:docMk/>
+            <pc:sldMk cId="3278151509" sldId="261"/>
+            <ac:spMk id="9" creationId="{D4771268-CB57-404A-9271-370EB28F6090}"/>
+          </ac:spMkLst>
+        </pc:spChg>
+        <pc:spChg chg="add del">
+          <ac:chgData name="Ihor Aleksandrov" userId="c3051032-6b87-4db2-b257-777a0106fbd9" providerId="ADAL" clId="{EA2B8A7D-3C52-4D81-9662-EF0FB964F7A9}" dt="2024-01-24T16:17:09.141" v="46"/>
+          <ac:spMkLst>
+            <pc:docMk/>
+            <pc:sldMk cId="3278151509" sldId="261"/>
+            <ac:spMk id="24" creationId="{D4771268-CB57-404A-9271-370EB28F6090}"/>
+          </ac:spMkLst>
+        </pc:spChg>
+        <pc:picChg chg="mod ord">
+          <ac:chgData name="Ihor Aleksandrov" userId="c3051032-6b87-4db2-b257-777a0106fbd9" providerId="ADAL" clId="{EA2B8A7D-3C52-4D81-9662-EF0FB964F7A9}" dt="2024-01-24T16:17:46.040" v="49" actId="1076"/>
+          <ac:picMkLst>
+            <pc:docMk/>
+            <pc:sldMk cId="3278151509" sldId="261"/>
+            <ac:picMk id="4" creationId="{110B72A2-37FD-3982-5358-333497678F76}"/>
+          </ac:picMkLst>
+        </pc:picChg>
+      </pc:sldChg>
+      <pc:sldChg chg="addSp delSp modSp add mod setBg delDesignElem">
+        <pc:chgData name="Ihor Aleksandrov" userId="c3051032-6b87-4db2-b257-777a0106fbd9" providerId="ADAL" clId="{EA2B8A7D-3C52-4D81-9662-EF0FB964F7A9}" dt="2024-01-24T16:20:59.581" v="66" actId="1076"/>
+        <pc:sldMkLst>
+          <pc:docMk/>
+          <pc:sldMk cId="3670086471" sldId="262"/>
+        </pc:sldMkLst>
+        <pc:spChg chg="mod">
+          <ac:chgData name="Ihor Aleksandrov" userId="c3051032-6b87-4db2-b257-777a0106fbd9" providerId="ADAL" clId="{EA2B8A7D-3C52-4D81-9662-EF0FB964F7A9}" dt="2024-01-24T16:20:22.633" v="56" actId="26606"/>
+          <ac:spMkLst>
+            <pc:docMk/>
+            <pc:sldMk cId="3670086471" sldId="262"/>
+            <ac:spMk id="2" creationId="{53C5D828-9666-E312-B574-9FE965A7D6BE}"/>
+          </ac:spMkLst>
+        </pc:spChg>
+        <pc:spChg chg="add del">
+          <ac:chgData name="Ihor Aleksandrov" userId="c3051032-6b87-4db2-b257-777a0106fbd9" providerId="ADAL" clId="{EA2B8A7D-3C52-4D81-9662-EF0FB964F7A9}" dt="2024-01-24T16:20:43.237" v="60" actId="22"/>
+          <ac:spMkLst>
+            <pc:docMk/>
+            <pc:sldMk cId="3670086471" sldId="262"/>
+            <ac:spMk id="5" creationId="{87F45561-879D-7670-C001-865486ED03AA}"/>
+          </ac:spMkLst>
+        </pc:spChg>
+        <pc:spChg chg="add mod">
+          <ac:chgData name="Ihor Aleksandrov" userId="c3051032-6b87-4db2-b257-777a0106fbd9" providerId="ADAL" clId="{EA2B8A7D-3C52-4D81-9662-EF0FB964F7A9}" dt="2024-01-24T16:20:59.581" v="66" actId="1076"/>
+          <ac:spMkLst>
+            <pc:docMk/>
+            <pc:sldMk cId="3670086471" sldId="262"/>
+            <ac:spMk id="7" creationId="{0C7CD13E-FC32-AC89-26A1-AF80634998A4}"/>
+          </ac:spMkLst>
+        </pc:spChg>
+        <pc:spChg chg="add">
+          <ac:chgData name="Ihor Aleksandrov" userId="c3051032-6b87-4db2-b257-777a0106fbd9" providerId="ADAL" clId="{EA2B8A7D-3C52-4D81-9662-EF0FB964F7A9}" dt="2024-01-24T16:20:22.633" v="56" actId="26606"/>
+          <ac:spMkLst>
+            <pc:docMk/>
+            <pc:sldMk cId="3670086471" sldId="262"/>
+            <ac:spMk id="8" creationId="{D4771268-CB57-404A-9271-370EB28F6090}"/>
+          </ac:spMkLst>
+        </pc:spChg>
+        <pc:spChg chg="del">
+          <ac:chgData name="Ihor Aleksandrov" userId="c3051032-6b87-4db2-b257-777a0106fbd9" providerId="ADAL" clId="{EA2B8A7D-3C52-4D81-9662-EF0FB964F7A9}" dt="2024-01-24T16:20:18.797" v="55"/>
+          <ac:spMkLst>
+            <pc:docMk/>
+            <pc:sldMk cId="3670086471" sldId="262"/>
+            <ac:spMk id="24" creationId="{D4771268-CB57-404A-9271-370EB28F6090}"/>
+          </ac:spMkLst>
+        </pc:spChg>
+        <pc:picChg chg="mod ord">
+          <ac:chgData name="Ihor Aleksandrov" userId="c3051032-6b87-4db2-b257-777a0106fbd9" providerId="ADAL" clId="{EA2B8A7D-3C52-4D81-9662-EF0FB964F7A9}" dt="2024-01-24T16:20:28.992" v="58" actId="1076"/>
+          <ac:picMkLst>
+            <pc:docMk/>
+            <pc:sldMk cId="3670086471" sldId="262"/>
+            <ac:picMk id="3" creationId="{05A9FF40-DCEC-8E82-7C4D-BDBC1FAB1FDA}"/>
+          </ac:picMkLst>
+        </pc:picChg>
+      </pc:sldChg>
+      <pc:sldChg chg="addSp delSp modSp add mod setBg delDesignElem">
+        <pc:chgData name="Ihor Aleksandrov" userId="c3051032-6b87-4db2-b257-777a0106fbd9" providerId="ADAL" clId="{EA2B8A7D-3C52-4D81-9662-EF0FB964F7A9}" dt="2024-01-24T16:23:06.581" v="73" actId="1076"/>
+        <pc:sldMkLst>
+          <pc:docMk/>
+          <pc:sldMk cId="2476824021" sldId="263"/>
+        </pc:sldMkLst>
+        <pc:spChg chg="mod">
+          <ac:chgData name="Ihor Aleksandrov" userId="c3051032-6b87-4db2-b257-777a0106fbd9" providerId="ADAL" clId="{EA2B8A7D-3C52-4D81-9662-EF0FB964F7A9}" dt="2024-01-24T16:22:47.826" v="69" actId="26606"/>
+          <ac:spMkLst>
+            <pc:docMk/>
+            <pc:sldMk cId="2476824021" sldId="263"/>
+            <ac:spMk id="2" creationId="{53C5D828-9666-E312-B574-9FE965A7D6BE}"/>
+          </ac:spMkLst>
+        </pc:spChg>
+        <pc:spChg chg="add mod">
+          <ac:chgData name="Ihor Aleksandrov" userId="c3051032-6b87-4db2-b257-777a0106fbd9" providerId="ADAL" clId="{EA2B8A7D-3C52-4D81-9662-EF0FB964F7A9}" dt="2024-01-24T16:23:06.581" v="73" actId="1076"/>
+          <ac:spMkLst>
+            <pc:docMk/>
+            <pc:sldMk cId="2476824021" sldId="263"/>
+            <ac:spMk id="5" creationId="{E202FD3D-76E9-4318-0828-6FB8B5DBD2C5}"/>
+          </ac:spMkLst>
+        </pc:spChg>
+        <pc:spChg chg="add">
+          <ac:chgData name="Ihor Aleksandrov" userId="c3051032-6b87-4db2-b257-777a0106fbd9" providerId="ADAL" clId="{EA2B8A7D-3C52-4D81-9662-EF0FB964F7A9}" dt="2024-01-24T16:22:47.826" v="69" actId="26606"/>
+          <ac:spMkLst>
+            <pc:docMk/>
+            <pc:sldMk cId="2476824021" sldId="263"/>
+            <ac:spMk id="9" creationId="{D4771268-CB57-404A-9271-370EB28F6090}"/>
+          </ac:spMkLst>
+        </pc:spChg>
+        <pc:spChg chg="del">
+          <ac:chgData name="Ihor Aleksandrov" userId="c3051032-6b87-4db2-b257-777a0106fbd9" providerId="ADAL" clId="{EA2B8A7D-3C52-4D81-9662-EF0FB964F7A9}" dt="2024-01-24T16:22:44.812" v="68"/>
+          <ac:spMkLst>
+            <pc:docMk/>
+            <pc:sldMk cId="2476824021" sldId="263"/>
+            <ac:spMk id="24" creationId="{D4771268-CB57-404A-9271-370EB28F6090}"/>
+          </ac:spMkLst>
+        </pc:spChg>
+        <pc:picChg chg="mod">
+          <ac:chgData name="Ihor Aleksandrov" userId="c3051032-6b87-4db2-b257-777a0106fbd9" providerId="ADAL" clId="{EA2B8A7D-3C52-4D81-9662-EF0FB964F7A9}" dt="2024-01-24T16:22:54.712" v="71" actId="1076"/>
+          <ac:picMkLst>
+            <pc:docMk/>
+            <pc:sldMk cId="2476824021" sldId="263"/>
+            <ac:picMk id="4" creationId="{0A4A47BB-B86E-CE6D-6738-81D9FF41289F}"/>
+          </ac:picMkLst>
+        </pc:picChg>
+      </pc:sldChg>
+      <pc:sldChg chg="addSp delSp modSp add del mod setBg delDesignElem">
+        <pc:chgData name="Ihor Aleksandrov" userId="c3051032-6b87-4db2-b257-777a0106fbd9" providerId="ADAL" clId="{EA2B8A7D-3C52-4D81-9662-EF0FB964F7A9}" dt="2024-01-24T16:26:03.232" v="79" actId="47"/>
+        <pc:sldMkLst>
+          <pc:docMk/>
+          <pc:sldMk cId="303933854" sldId="264"/>
+        </pc:sldMkLst>
+        <pc:spChg chg="mod">
+          <ac:chgData name="Ihor Aleksandrov" userId="c3051032-6b87-4db2-b257-777a0106fbd9" providerId="ADAL" clId="{EA2B8A7D-3C52-4D81-9662-EF0FB964F7A9}" dt="2024-01-24T16:25:24.035" v="76" actId="26606"/>
+          <ac:spMkLst>
+            <pc:docMk/>
+            <pc:sldMk cId="303933854" sldId="264"/>
+            <ac:spMk id="2" creationId="{53C5D828-9666-E312-B574-9FE965A7D6BE}"/>
+          </ac:spMkLst>
+        </pc:spChg>
+        <pc:spChg chg="add">
+          <ac:chgData name="Ihor Aleksandrov" userId="c3051032-6b87-4db2-b257-777a0106fbd9" providerId="ADAL" clId="{EA2B8A7D-3C52-4D81-9662-EF0FB964F7A9}" dt="2024-01-24T16:25:24.035" v="76" actId="26606"/>
+          <ac:spMkLst>
+            <pc:docMk/>
+            <pc:sldMk cId="303933854" sldId="264"/>
+            <ac:spMk id="10" creationId="{53F29798-D584-4792-9B62-3F5F5C36D619}"/>
+          </ac:spMkLst>
+        </pc:spChg>
+        <pc:spChg chg="del">
+          <ac:chgData name="Ihor Aleksandrov" userId="c3051032-6b87-4db2-b257-777a0106fbd9" providerId="ADAL" clId="{EA2B8A7D-3C52-4D81-9662-EF0FB964F7A9}" dt="2024-01-24T16:25:20.099" v="75"/>
+          <ac:spMkLst>
+            <pc:docMk/>
+            <pc:sldMk cId="303933854" sldId="264"/>
+            <ac:spMk id="24" creationId="{D4771268-CB57-404A-9271-370EB28F6090}"/>
+          </ac:spMkLst>
+        </pc:spChg>
+        <pc:picChg chg="mod">
+          <ac:chgData name="Ihor Aleksandrov" userId="c3051032-6b87-4db2-b257-777a0106fbd9" providerId="ADAL" clId="{EA2B8A7D-3C52-4D81-9662-EF0FB964F7A9}" dt="2024-01-24T16:25:24.035" v="76" actId="26606"/>
+          <ac:picMkLst>
+            <pc:docMk/>
+            <pc:sldMk cId="303933854" sldId="264"/>
+            <ac:picMk id="3" creationId="{438AE1ED-C17A-0BC4-8D21-4B49E9F91B9F}"/>
+          </ac:picMkLst>
+        </pc:picChg>
+        <pc:picChg chg="mod ord">
+          <ac:chgData name="Ihor Aleksandrov" userId="c3051032-6b87-4db2-b257-777a0106fbd9" providerId="ADAL" clId="{EA2B8A7D-3C52-4D81-9662-EF0FB964F7A9}" dt="2024-01-24T16:25:24.035" v="76" actId="26606"/>
+          <ac:picMkLst>
+            <pc:docMk/>
+            <pc:sldMk cId="303933854" sldId="264"/>
+            <ac:picMk id="5" creationId="{699631DD-6035-BB9F-11EC-4E9F01F1D081}"/>
+          </ac:picMkLst>
+        </pc:picChg>
+      </pc:sldChg>
+      <pc:sldChg chg="delSp add del mod setBg delDesignElem">
+        <pc:chgData name="Ihor Aleksandrov" userId="c3051032-6b87-4db2-b257-777a0106fbd9" providerId="ADAL" clId="{EA2B8A7D-3C52-4D81-9662-EF0FB964F7A9}" dt="2024-01-24T16:26:15.663" v="82" actId="2696"/>
+        <pc:sldMkLst>
+          <pc:docMk/>
+          <pc:sldMk cId="3329585973" sldId="265"/>
+        </pc:sldMkLst>
+        <pc:spChg chg="del">
+          <ac:chgData name="Ihor Aleksandrov" userId="c3051032-6b87-4db2-b257-777a0106fbd9" providerId="ADAL" clId="{EA2B8A7D-3C52-4D81-9662-EF0FB964F7A9}" dt="2024-01-24T16:25:53.024" v="78"/>
+          <ac:spMkLst>
+            <pc:docMk/>
+            <pc:sldMk cId="3329585973" sldId="265"/>
+            <ac:spMk id="24" creationId="{D4771268-CB57-404A-9271-370EB28F6090}"/>
+          </ac:spMkLst>
+        </pc:spChg>
+        <pc:picChg chg="del">
+          <ac:chgData name="Ihor Aleksandrov" userId="c3051032-6b87-4db2-b257-777a0106fbd9" providerId="ADAL" clId="{EA2B8A7D-3C52-4D81-9662-EF0FB964F7A9}" dt="2024-01-24T16:26:11.119" v="81" actId="21"/>
+          <ac:picMkLst>
+            <pc:docMk/>
+            <pc:sldMk cId="3329585973" sldId="265"/>
+            <ac:picMk id="3" creationId="{438AE1ED-C17A-0BC4-8D21-4B49E9F91B9F}"/>
+          </ac:picMkLst>
+        </pc:picChg>
+        <pc:picChg chg="del">
+          <ac:chgData name="Ihor Aleksandrov" userId="c3051032-6b87-4db2-b257-777a0106fbd9" providerId="ADAL" clId="{EA2B8A7D-3C52-4D81-9662-EF0FB964F7A9}" dt="2024-01-24T16:26:11.119" v="81" actId="21"/>
+          <ac:picMkLst>
+            <pc:docMk/>
+            <pc:sldMk cId="3329585973" sldId="265"/>
+            <ac:picMk id="5" creationId="{699631DD-6035-BB9F-11EC-4E9F01F1D081}"/>
+          </ac:picMkLst>
+        </pc:picChg>
+      </pc:sldChg>
+      <pc:sldChg chg="delSp add del mod setBg delDesignElem">
+        <pc:chgData name="Ihor Aleksandrov" userId="c3051032-6b87-4db2-b257-777a0106fbd9" providerId="ADAL" clId="{EA2B8A7D-3C52-4D81-9662-EF0FB964F7A9}" dt="2024-01-24T16:30:49.711" v="105" actId="47"/>
+        <pc:sldMkLst>
+          <pc:docMk/>
+          <pc:sldMk cId="3569579791" sldId="265"/>
+        </pc:sldMkLst>
+        <pc:spChg chg="del">
+          <ac:chgData name="Ihor Aleksandrov" userId="c3051032-6b87-4db2-b257-777a0106fbd9" providerId="ADAL" clId="{EA2B8A7D-3C52-4D81-9662-EF0FB964F7A9}" dt="2024-01-24T16:30:40.099" v="103" actId="478"/>
+          <ac:spMkLst>
+            <pc:docMk/>
+            <pc:sldMk cId="3569579791" sldId="265"/>
+            <ac:spMk id="6" creationId="{E04F08BD-B70E-B1A8-7328-EE29B18E4AA1}"/>
+          </ac:spMkLst>
+        </pc:spChg>
+        <pc:spChg chg="del">
+          <ac:chgData name="Ihor Aleksandrov" userId="c3051032-6b87-4db2-b257-777a0106fbd9" providerId="ADAL" clId="{EA2B8A7D-3C52-4D81-9662-EF0FB964F7A9}" dt="2024-01-24T16:30:26.607" v="102"/>
+          <ac:spMkLst>
+            <pc:docMk/>
+            <pc:sldMk cId="3569579791" sldId="265"/>
+            <ac:spMk id="24" creationId="{D4771268-CB57-404A-9271-370EB28F6090}"/>
+          </ac:spMkLst>
+        </pc:spChg>
+      </pc:sldChg>
+      <pc:sldChg chg="addSp delSp modSp add mod">
+        <pc:chgData name="Ihor Aleksandrov" userId="c3051032-6b87-4db2-b257-777a0106fbd9" providerId="ADAL" clId="{EA2B8A7D-3C52-4D81-9662-EF0FB964F7A9}" dt="2024-01-24T16:27:15.280" v="97"/>
+        <pc:sldMkLst>
+          <pc:docMk/>
+          <pc:sldMk cId="1454947672" sldId="266"/>
+        </pc:sldMkLst>
+        <pc:spChg chg="mod">
+          <ac:chgData name="Ihor Aleksandrov" userId="c3051032-6b87-4db2-b257-777a0106fbd9" providerId="ADAL" clId="{EA2B8A7D-3C52-4D81-9662-EF0FB964F7A9}" dt="2024-01-24T16:27:15.280" v="97"/>
+          <ac:spMkLst>
+            <pc:docMk/>
+            <pc:sldMk cId="1454947672" sldId="266"/>
+            <ac:spMk id="2" creationId="{53C5D828-9666-E312-B574-9FE965A7D6BE}"/>
+          </ac:spMkLst>
+        </pc:spChg>
+        <pc:spChg chg="del mod">
+          <ac:chgData name="Ihor Aleksandrov" userId="c3051032-6b87-4db2-b257-777a0106fbd9" providerId="ADAL" clId="{EA2B8A7D-3C52-4D81-9662-EF0FB964F7A9}" dt="2024-01-24T16:26:42.413" v="88" actId="478"/>
+          <ac:spMkLst>
+            <pc:docMk/>
+            <pc:sldMk cId="1454947672" sldId="266"/>
+            <ac:spMk id="5" creationId="{E202FD3D-76E9-4318-0828-6FB8B5DBD2C5}"/>
+          </ac:spMkLst>
+        </pc:spChg>
+        <pc:spChg chg="add del">
+          <ac:chgData name="Ihor Aleksandrov" userId="c3051032-6b87-4db2-b257-777a0106fbd9" providerId="ADAL" clId="{EA2B8A7D-3C52-4D81-9662-EF0FB964F7A9}" dt="2024-01-24T16:26:47.309" v="90" actId="22"/>
+          <ac:spMkLst>
+            <pc:docMk/>
+            <pc:sldMk cId="1454947672" sldId="266"/>
+            <ac:spMk id="7" creationId="{EBBF43C8-41E2-AE32-94D4-F581BEA6FE8A}"/>
+          </ac:spMkLst>
+        </pc:spChg>
+        <pc:spChg chg="add mod">
+          <ac:chgData name="Ihor Aleksandrov" userId="c3051032-6b87-4db2-b257-777a0106fbd9" providerId="ADAL" clId="{EA2B8A7D-3C52-4D81-9662-EF0FB964F7A9}" dt="2024-01-24T16:26:50.235" v="92" actId="1076"/>
+          <ac:spMkLst>
+            <pc:docMk/>
+            <pc:sldMk cId="1454947672" sldId="266"/>
+            <ac:spMk id="10" creationId="{876EA409-9CED-1530-7AE1-2CE040ED9572}"/>
+          </ac:spMkLst>
+        </pc:spChg>
+        <pc:spChg chg="add del">
+          <ac:chgData name="Ihor Aleksandrov" userId="c3051032-6b87-4db2-b257-777a0106fbd9" providerId="ADAL" clId="{EA2B8A7D-3C52-4D81-9662-EF0FB964F7A9}" dt="2024-01-24T16:27:03.773" v="94" actId="22"/>
+          <ac:spMkLst>
+            <pc:docMk/>
+            <pc:sldMk cId="1454947672" sldId="266"/>
+            <ac:spMk id="12" creationId="{B2D7BD0E-CC55-1DD1-5742-E58CD9EC1D9B}"/>
+          </ac:spMkLst>
+        </pc:spChg>
+        <pc:spChg chg="add mod">
+          <ac:chgData name="Ihor Aleksandrov" userId="c3051032-6b87-4db2-b257-777a0106fbd9" providerId="ADAL" clId="{EA2B8A7D-3C52-4D81-9662-EF0FB964F7A9}" dt="2024-01-24T16:27:06.948" v="96" actId="1076"/>
+          <ac:spMkLst>
+            <pc:docMk/>
+            <pc:sldMk cId="1454947672" sldId="266"/>
+            <ac:spMk id="14" creationId="{51860035-8393-B608-A571-9F2BF673BAF4}"/>
+          </ac:spMkLst>
+        </pc:spChg>
+        <pc:picChg chg="add mod">
+          <ac:chgData name="Ihor Aleksandrov" userId="c3051032-6b87-4db2-b257-777a0106fbd9" providerId="ADAL" clId="{EA2B8A7D-3C52-4D81-9662-EF0FB964F7A9}" dt="2024-01-24T16:26:30.403" v="86" actId="1076"/>
+          <ac:picMkLst>
+            <pc:docMk/>
+            <pc:sldMk cId="1454947672" sldId="266"/>
+            <ac:picMk id="3" creationId="{4E45773B-3762-41A2-A15B-67E57E13AFF0}"/>
+          </ac:picMkLst>
+        </pc:picChg>
+        <pc:picChg chg="del">
+          <ac:chgData name="Ihor Aleksandrov" userId="c3051032-6b87-4db2-b257-777a0106fbd9" providerId="ADAL" clId="{EA2B8A7D-3C52-4D81-9662-EF0FB964F7A9}" dt="2024-01-24T16:26:26.334" v="85" actId="478"/>
+          <ac:picMkLst>
+            <pc:docMk/>
+            <pc:sldMk cId="1454947672" sldId="266"/>
+            <ac:picMk id="4" creationId="{0A4A47BB-B86E-CE6D-6738-81D9FF41289F}"/>
+          </ac:picMkLst>
+        </pc:picChg>
+      </pc:sldChg>
+      <pc:sldChg chg="addSp delSp modSp add mod">
+        <pc:chgData name="Ihor Aleksandrov" userId="c3051032-6b87-4db2-b257-777a0106fbd9" providerId="ADAL" clId="{EA2B8A7D-3C52-4D81-9662-EF0FB964F7A9}" dt="2024-01-24T16:31:25.335" v="112" actId="1076"/>
+        <pc:sldMkLst>
+          <pc:docMk/>
+          <pc:sldMk cId="361920255" sldId="267"/>
+        </pc:sldMkLst>
+        <pc:spChg chg="mod">
+          <ac:chgData name="Ihor Aleksandrov" userId="c3051032-6b87-4db2-b257-777a0106fbd9" providerId="ADAL" clId="{EA2B8A7D-3C52-4D81-9662-EF0FB964F7A9}" dt="2024-01-24T16:31:13.857" v="110"/>
+          <ac:spMkLst>
+            <pc:docMk/>
+            <pc:sldMk cId="361920255" sldId="267"/>
+            <ac:spMk id="2" creationId="{53C5D828-9666-E312-B574-9FE965A7D6BE}"/>
+          </ac:spMkLst>
+        </pc:spChg>
+        <pc:spChg chg="add mod">
+          <ac:chgData name="Ihor Aleksandrov" userId="c3051032-6b87-4db2-b257-777a0106fbd9" providerId="ADAL" clId="{EA2B8A7D-3C52-4D81-9662-EF0FB964F7A9}" dt="2024-01-24T16:31:25.335" v="112" actId="1076"/>
+          <ac:spMkLst>
+            <pc:docMk/>
+            <pc:sldMk cId="361920255" sldId="267"/>
+            <ac:spMk id="5" creationId="{02856B1C-9D37-7B11-BA48-D0E2FC265F83}"/>
+          </ac:spMkLst>
+        </pc:spChg>
+        <pc:spChg chg="del mod">
+          <ac:chgData name="Ihor Aleksandrov" userId="c3051032-6b87-4db2-b257-777a0106fbd9" providerId="ADAL" clId="{EA2B8A7D-3C52-4D81-9662-EF0FB964F7A9}" dt="2024-01-24T16:30:58.832" v="107" actId="478"/>
+          <ac:spMkLst>
+            <pc:docMk/>
+            <pc:sldMk cId="361920255" sldId="267"/>
+            <ac:spMk id="10" creationId="{876EA409-9CED-1530-7AE1-2CE040ED9572}"/>
+          </ac:spMkLst>
+        </pc:spChg>
+        <pc:spChg chg="del">
+          <ac:chgData name="Ihor Aleksandrov" userId="c3051032-6b87-4db2-b257-777a0106fbd9" providerId="ADAL" clId="{EA2B8A7D-3C52-4D81-9662-EF0FB964F7A9}" dt="2024-01-24T16:31:00.543" v="108" actId="478"/>
+          <ac:spMkLst>
+            <pc:docMk/>
+            <pc:sldMk cId="361920255" sldId="267"/>
+            <ac:spMk id="14" creationId="{51860035-8393-B608-A571-9F2BF673BAF4}"/>
+          </ac:spMkLst>
+        </pc:spChg>
+        <pc:picChg chg="del">
+          <ac:chgData name="Ihor Aleksandrov" userId="c3051032-6b87-4db2-b257-777a0106fbd9" providerId="ADAL" clId="{EA2B8A7D-3C52-4D81-9662-EF0FB964F7A9}" dt="2024-01-24T16:31:01.377" v="109" actId="478"/>
+          <ac:picMkLst>
+            <pc:docMk/>
+            <pc:sldMk cId="361920255" sldId="267"/>
+            <ac:picMk id="3" creationId="{4E45773B-3762-41A2-A15B-67E57E13AFF0}"/>
+          </ac:picMkLst>
+        </pc:picChg>
+      </pc:sldChg>
+      <pc:sldChg chg="addSp delSp modSp add mod">
+        <pc:chgData name="Ihor Aleksandrov" userId="c3051032-6b87-4db2-b257-777a0106fbd9" providerId="ADAL" clId="{EA2B8A7D-3C52-4D81-9662-EF0FB964F7A9}" dt="2024-01-24T16:32:14.326" v="126" actId="1076"/>
+        <pc:sldMkLst>
+          <pc:docMk/>
+          <pc:sldMk cId="2161892916" sldId="268"/>
+        </pc:sldMkLst>
+        <pc:spChg chg="mod">
+          <ac:chgData name="Ihor Aleksandrov" userId="c3051032-6b87-4db2-b257-777a0106fbd9" providerId="ADAL" clId="{EA2B8A7D-3C52-4D81-9662-EF0FB964F7A9}" dt="2024-01-24T16:31:48.062" v="116"/>
+          <ac:spMkLst>
+            <pc:docMk/>
+            <pc:sldMk cId="2161892916" sldId="268"/>
+            <ac:spMk id="2" creationId="{53C5D828-9666-E312-B574-9FE965A7D6BE}"/>
+          </ac:spMkLst>
+        </pc:spChg>
+        <pc:spChg chg="add del mod">
+          <ac:chgData name="Ihor Aleksandrov" userId="c3051032-6b87-4db2-b257-777a0106fbd9" providerId="ADAL" clId="{EA2B8A7D-3C52-4D81-9662-EF0FB964F7A9}" dt="2024-01-24T16:32:05.265" v="122" actId="22"/>
+          <ac:spMkLst>
+            <pc:docMk/>
+            <pc:sldMk cId="2161892916" sldId="268"/>
+            <ac:spMk id="4" creationId="{B8915959-A3F5-CE1D-2197-4D202DD13295}"/>
+          </ac:spMkLst>
+        </pc:spChg>
+        <pc:spChg chg="del mod">
+          <ac:chgData name="Ihor Aleksandrov" userId="c3051032-6b87-4db2-b257-777a0106fbd9" providerId="ADAL" clId="{EA2B8A7D-3C52-4D81-9662-EF0FB964F7A9}" dt="2024-01-24T16:31:54.161" v="118" actId="478"/>
+          <ac:spMkLst>
+            <pc:docMk/>
+            <pc:sldMk cId="2161892916" sldId="268"/>
+            <ac:spMk id="5" creationId="{02856B1C-9D37-7B11-BA48-D0E2FC265F83}"/>
+          </ac:spMkLst>
+        </pc:spChg>
+        <pc:spChg chg="add del">
+          <ac:chgData name="Ihor Aleksandrov" userId="c3051032-6b87-4db2-b257-777a0106fbd9" providerId="ADAL" clId="{EA2B8A7D-3C52-4D81-9662-EF0FB964F7A9}" dt="2024-01-24T16:32:08.037" v="124" actId="22"/>
+          <ac:spMkLst>
+            <pc:docMk/>
+            <pc:sldMk cId="2161892916" sldId="268"/>
+            <ac:spMk id="7" creationId="{DCE8D0BA-A771-5143-4367-C42932080953}"/>
+          </ac:spMkLst>
+        </pc:spChg>
+        <pc:spChg chg="add mod">
+          <ac:chgData name="Ihor Aleksandrov" userId="c3051032-6b87-4db2-b257-777a0106fbd9" providerId="ADAL" clId="{EA2B8A7D-3C52-4D81-9662-EF0FB964F7A9}" dt="2024-01-24T16:32:14.326" v="126" actId="1076"/>
+          <ac:spMkLst>
+            <pc:docMk/>
+            <pc:sldMk cId="2161892916" sldId="268"/>
+            <ac:spMk id="10" creationId="{F24BEA27-D44B-2EE7-CAFE-869E74A5EAC6}"/>
+          </ac:spMkLst>
+        </pc:spChg>
+      </pc:sldChg>
+      <pc:sldChg chg="modSp add mod">
+        <pc:chgData name="Ihor Aleksandrov" userId="c3051032-6b87-4db2-b257-777a0106fbd9" providerId="ADAL" clId="{EA2B8A7D-3C52-4D81-9662-EF0FB964F7A9}" dt="2024-01-24T16:33:04.330" v="132" actId="1076"/>
+        <pc:sldMkLst>
+          <pc:docMk/>
+          <pc:sldMk cId="3157685417" sldId="269"/>
+        </pc:sldMkLst>
+        <pc:spChg chg="mod">
+          <ac:chgData name="Ihor Aleksandrov" userId="c3051032-6b87-4db2-b257-777a0106fbd9" providerId="ADAL" clId="{EA2B8A7D-3C52-4D81-9662-EF0FB964F7A9}" dt="2024-01-24T16:32:51.150" v="130"/>
+          <ac:spMkLst>
+            <pc:docMk/>
+            <pc:sldMk cId="3157685417" sldId="269"/>
+            <ac:spMk id="2" creationId="{53C5D828-9666-E312-B574-9FE965A7D6BE}"/>
+          </ac:spMkLst>
+        </pc:spChg>
+        <pc:spChg chg="mod">
+          <ac:chgData name="Ihor Aleksandrov" userId="c3051032-6b87-4db2-b257-777a0106fbd9" providerId="ADAL" clId="{EA2B8A7D-3C52-4D81-9662-EF0FB964F7A9}" dt="2024-01-24T16:33:04.330" v="132" actId="1076"/>
+          <ac:spMkLst>
+            <pc:docMk/>
+            <pc:sldMk cId="3157685417" sldId="269"/>
+            <ac:spMk id="10" creationId="{F24BEA27-D44B-2EE7-CAFE-869E74A5EAC6}"/>
+          </ac:spMkLst>
+        </pc:spChg>
+      </pc:sldChg>
+      <pc:sldMasterChg chg="add addSldLayout">
+        <pc:chgData name="Ihor Aleksandrov" userId="c3051032-6b87-4db2-b257-777a0106fbd9" providerId="ADAL" clId="{EA2B8A7D-3C52-4D81-9662-EF0FB964F7A9}" dt="2024-01-24T16:09:52.219" v="19" actId="27028"/>
+        <pc:sldMasterMkLst>
+          <pc:docMk/>
+          <pc:sldMasterMk cId="1579723609" sldId="2147483660"/>
+        </pc:sldMasterMkLst>
+        <pc:sldLayoutChg chg="add">
+          <pc:chgData name="Ihor Aleksandrov" userId="c3051032-6b87-4db2-b257-777a0106fbd9" providerId="ADAL" clId="{EA2B8A7D-3C52-4D81-9662-EF0FB964F7A9}" dt="2024-01-24T16:09:52.219" v="19" actId="27028"/>
+          <pc:sldLayoutMkLst>
+            <pc:docMk/>
+            <pc:sldMasterMk cId="1579723609" sldId="2147483660"/>
+            <pc:sldLayoutMk cId="1498987355" sldId="2147483662"/>
+          </pc:sldLayoutMkLst>
+        </pc:sldLayoutChg>
+      </pc:sldMasterChg>
+    </pc:docChg>
+  </pc:docChgLst>
+  <pc:docChgLst>
     <pc:chgData name="Ihor Aleksandrov" userId="c3051032-6b87-4db2-b257-777a0106fbd9" providerId="ADAL" clId="{56332CB3-8148-420A-A659-8047DFDBF6F1}"/>
     <pc:docChg chg="undo custSel addSld delSld modSld sldOrd addSection modSection">
-      <pc:chgData name="Ihor Aleksandrov" userId="c3051032-6b87-4db2-b257-777a0106fbd9" providerId="ADAL" clId="{56332CB3-8148-420A-A659-8047DFDBF6F1}" dt="2024-01-26T13:08:59.561" v="220" actId="20577"/>
+      <pc:chgData name="Ihor Aleksandrov" userId="c3051032-6b87-4db2-b257-777a0106fbd9" providerId="ADAL" clId="{56332CB3-8148-420A-A659-8047DFDBF6F1}" dt="2024-01-30T10:37:21.930" v="256" actId="1076"/>
       <pc:docMkLst>
         <pc:docMk/>
       </pc:docMkLst>
@@ -3122,6 +3730,21 @@
           </ac:spMkLst>
         </pc:spChg>
       </pc:sldChg>
+      <pc:sldChg chg="modSp mod">
+        <pc:chgData name="Ihor Aleksandrov" userId="c3051032-6b87-4db2-b257-777a0106fbd9" providerId="ADAL" clId="{56332CB3-8148-420A-A659-8047DFDBF6F1}" dt="2024-01-30T10:37:21.930" v="256" actId="1076"/>
+        <pc:sldMkLst>
+          <pc:docMk/>
+          <pc:sldMk cId="2972731808" sldId="308"/>
+        </pc:sldMkLst>
+        <pc:graphicFrameChg chg="mod">
+          <ac:chgData name="Ihor Aleksandrov" userId="c3051032-6b87-4db2-b257-777a0106fbd9" providerId="ADAL" clId="{56332CB3-8148-420A-A659-8047DFDBF6F1}" dt="2024-01-30T10:37:21.930" v="256" actId="1076"/>
+          <ac:graphicFrameMkLst>
+            <pc:docMk/>
+            <pc:sldMk cId="2972731808" sldId="308"/>
+            <ac:graphicFrameMk id="6" creationId="{0A25AD42-052A-793B-B420-809C33CC274D}"/>
+          </ac:graphicFrameMkLst>
+        </pc:graphicFrameChg>
+      </pc:sldChg>
       <pc:sldChg chg="del">
         <pc:chgData name="Ihor Aleksandrov" userId="c3051032-6b87-4db2-b257-777a0106fbd9" providerId="ADAL" clId="{56332CB3-8148-420A-A659-8047DFDBF6F1}" dt="2024-01-26T09:37:21.787" v="2" actId="2696"/>
         <pc:sldMkLst>
@@ -3958,615 +4581,6 @@
           </ac:picMkLst>
         </pc:picChg>
       </pc:sldChg>
-    </pc:docChg>
-  </pc:docChgLst>
-  <pc:docChgLst>
-    <pc:chgData name="Ihor Aleksandrov" userId="c3051032-6b87-4db2-b257-777a0106fbd9" providerId="ADAL" clId="{EA2B8A7D-3C52-4D81-9662-EF0FB964F7A9}"/>
-    <pc:docChg chg="undo custSel addSld delSld modSld addMainMaster">
-      <pc:chgData name="Ihor Aleksandrov" userId="c3051032-6b87-4db2-b257-777a0106fbd9" providerId="ADAL" clId="{EA2B8A7D-3C52-4D81-9662-EF0FB964F7A9}" dt="2024-01-24T16:33:04.330" v="132" actId="1076"/>
-      <pc:docMkLst>
-        <pc:docMk/>
-      </pc:docMkLst>
-      <pc:sldChg chg="addSp modSp mod">
-        <pc:chgData name="Ihor Aleksandrov" userId="c3051032-6b87-4db2-b257-777a0106fbd9" providerId="ADAL" clId="{EA2B8A7D-3C52-4D81-9662-EF0FB964F7A9}" dt="2024-01-24T16:06:56.557" v="4" actId="1076"/>
-        <pc:sldMkLst>
-          <pc:docMk/>
-          <pc:sldMk cId="3270890867" sldId="257"/>
-        </pc:sldMkLst>
-        <pc:picChg chg="add mod">
-          <ac:chgData name="Ihor Aleksandrov" userId="c3051032-6b87-4db2-b257-777a0106fbd9" providerId="ADAL" clId="{EA2B8A7D-3C52-4D81-9662-EF0FB964F7A9}" dt="2024-01-24T16:06:56.557" v="4" actId="1076"/>
-          <ac:picMkLst>
-            <pc:docMk/>
-            <pc:sldMk cId="3270890867" sldId="257"/>
-            <ac:picMk id="3" creationId="{4E689865-968D-3D93-994B-3AAC3051378B}"/>
-          </ac:picMkLst>
-        </pc:picChg>
-      </pc:sldChg>
-      <pc:sldChg chg="addSp delSp modSp mod">
-        <pc:chgData name="Ihor Aleksandrov" userId="c3051032-6b87-4db2-b257-777a0106fbd9" providerId="ADAL" clId="{EA2B8A7D-3C52-4D81-9662-EF0FB964F7A9}" dt="2024-01-24T16:10:01.112" v="22" actId="21"/>
-        <pc:sldMkLst>
-          <pc:docMk/>
-          <pc:sldMk cId="3417182101" sldId="258"/>
-        </pc:sldMkLst>
-        <pc:spChg chg="add mod">
-          <ac:chgData name="Ihor Aleksandrov" userId="c3051032-6b87-4db2-b257-777a0106fbd9" providerId="ADAL" clId="{EA2B8A7D-3C52-4D81-9662-EF0FB964F7A9}" dt="2024-01-24T16:08:27.998" v="15" actId="14100"/>
-          <ac:spMkLst>
-            <pc:docMk/>
-            <pc:sldMk cId="3417182101" sldId="258"/>
-            <ac:spMk id="5" creationId="{3101D806-403A-F079-818A-1207B8442687}"/>
-          </ac:spMkLst>
-        </pc:spChg>
-        <pc:picChg chg="add mod">
-          <ac:chgData name="Ihor Aleksandrov" userId="c3051032-6b87-4db2-b257-777a0106fbd9" providerId="ADAL" clId="{EA2B8A7D-3C52-4D81-9662-EF0FB964F7A9}" dt="2024-01-24T16:07:17.540" v="7" actId="1076"/>
-          <ac:picMkLst>
-            <pc:docMk/>
-            <pc:sldMk cId="3417182101" sldId="258"/>
-            <ac:picMk id="3" creationId="{73192EE5-F292-E8DF-78BB-C480918593D9}"/>
-          </ac:picMkLst>
-        </pc:picChg>
-        <pc:picChg chg="add del">
-          <ac:chgData name="Ihor Aleksandrov" userId="c3051032-6b87-4db2-b257-777a0106fbd9" providerId="ADAL" clId="{EA2B8A7D-3C52-4D81-9662-EF0FB964F7A9}" dt="2024-01-24T16:10:01.112" v="22" actId="21"/>
-          <ac:picMkLst>
-            <pc:docMk/>
-            <pc:sldMk cId="3417182101" sldId="258"/>
-            <ac:picMk id="6" creationId="{C576D1E6-CE0C-96E3-680F-E1B2C62F8CF7}"/>
-          </ac:picMkLst>
-        </pc:picChg>
-      </pc:sldChg>
-      <pc:sldChg chg="addSp delSp modSp add del mod">
-        <pc:chgData name="Ihor Aleksandrov" userId="c3051032-6b87-4db2-b257-777a0106fbd9" providerId="ADAL" clId="{EA2B8A7D-3C52-4D81-9662-EF0FB964F7A9}" dt="2024-01-24T16:09:34.630" v="18" actId="47"/>
-        <pc:sldMkLst>
-          <pc:docMk/>
-          <pc:sldMk cId="1989911605" sldId="259"/>
-        </pc:sldMkLst>
-        <pc:picChg chg="del">
-          <ac:chgData name="Ihor Aleksandrov" userId="c3051032-6b87-4db2-b257-777a0106fbd9" providerId="ADAL" clId="{EA2B8A7D-3C52-4D81-9662-EF0FB964F7A9}" dt="2024-01-24T16:07:27.525" v="9" actId="478"/>
-          <ac:picMkLst>
-            <pc:docMk/>
-            <pc:sldMk cId="1989911605" sldId="259"/>
-            <ac:picMk id="3" creationId="{73192EE5-F292-E8DF-78BB-C480918593D9}"/>
-          </ac:picMkLst>
-        </pc:picChg>
-        <pc:picChg chg="add del mod">
-          <ac:chgData name="Ihor Aleksandrov" userId="c3051032-6b87-4db2-b257-777a0106fbd9" providerId="ADAL" clId="{EA2B8A7D-3C52-4D81-9662-EF0FB964F7A9}" dt="2024-01-24T16:09:28.758" v="16" actId="21"/>
-          <ac:picMkLst>
-            <pc:docMk/>
-            <pc:sldMk cId="1989911605" sldId="259"/>
-            <ac:picMk id="4" creationId="{9B699F11-38F0-D536-EC59-183316D30A0B}"/>
-          </ac:picMkLst>
-        </pc:picChg>
-      </pc:sldChg>
-      <pc:sldChg chg="addSp delSp modSp add mod">
-        <pc:chgData name="Ihor Aleksandrov" userId="c3051032-6b87-4db2-b257-777a0106fbd9" providerId="ADAL" clId="{EA2B8A7D-3C52-4D81-9662-EF0FB964F7A9}" dt="2024-01-24T16:10:33.240" v="28" actId="14100"/>
-        <pc:sldMkLst>
-          <pc:docMk/>
-          <pc:sldMk cId="2385514391" sldId="259"/>
-        </pc:sldMkLst>
-        <pc:spChg chg="add mod">
-          <ac:chgData name="Ihor Aleksandrov" userId="c3051032-6b87-4db2-b257-777a0106fbd9" providerId="ADAL" clId="{EA2B8A7D-3C52-4D81-9662-EF0FB964F7A9}" dt="2024-01-24T16:10:33.240" v="28" actId="14100"/>
-          <ac:spMkLst>
-            <pc:docMk/>
-            <pc:sldMk cId="2385514391" sldId="259"/>
-            <ac:spMk id="6" creationId="{115DFACF-1AA5-C3DC-C0A7-872F6D553428}"/>
-          </ac:spMkLst>
-        </pc:spChg>
-        <pc:picChg chg="add mod">
-          <ac:chgData name="Ihor Aleksandrov" userId="c3051032-6b87-4db2-b257-777a0106fbd9" providerId="ADAL" clId="{EA2B8A7D-3C52-4D81-9662-EF0FB964F7A9}" dt="2024-01-24T16:10:10.447" v="25" actId="1076"/>
-          <ac:picMkLst>
-            <pc:docMk/>
-            <pc:sldMk cId="2385514391" sldId="259"/>
-            <ac:picMk id="3" creationId="{94771F4B-C97E-4C7E-EE32-62B9CE4843E8}"/>
-          </ac:picMkLst>
-        </pc:picChg>
-        <pc:picChg chg="del">
-          <ac:chgData name="Ihor Aleksandrov" userId="c3051032-6b87-4db2-b257-777a0106fbd9" providerId="ADAL" clId="{EA2B8A7D-3C52-4D81-9662-EF0FB964F7A9}" dt="2024-01-24T16:09:56.379" v="21" actId="478"/>
-          <ac:picMkLst>
-            <pc:docMk/>
-            <pc:sldMk cId="2385514391" sldId="259"/>
-            <ac:picMk id="4" creationId="{385F9644-E8EA-6C22-DF80-DC79BE06769D}"/>
-          </ac:picMkLst>
-        </pc:picChg>
-      </pc:sldChg>
-      <pc:sldChg chg="addSp delSp modSp add mod">
-        <pc:chgData name="Ihor Aleksandrov" userId="c3051032-6b87-4db2-b257-777a0106fbd9" providerId="ADAL" clId="{EA2B8A7D-3C52-4D81-9662-EF0FB964F7A9}" dt="2024-01-24T16:14:38.639" v="41" actId="14100"/>
-        <pc:sldMkLst>
-          <pc:docMk/>
-          <pc:sldMk cId="1272792471" sldId="260"/>
-        </pc:sldMkLst>
-        <pc:spChg chg="add del">
-          <ac:chgData name="Ihor Aleksandrov" userId="c3051032-6b87-4db2-b257-777a0106fbd9" providerId="ADAL" clId="{EA2B8A7D-3C52-4D81-9662-EF0FB964F7A9}" dt="2024-01-24T16:14:31.607" v="38" actId="22"/>
-          <ac:spMkLst>
-            <pc:docMk/>
-            <pc:sldMk cId="1272792471" sldId="260"/>
-            <ac:spMk id="6" creationId="{3FE0DD55-F1FF-817B-C521-E1B38C3903B5}"/>
-          </ac:spMkLst>
-        </pc:spChg>
-        <pc:spChg chg="add mod">
-          <ac:chgData name="Ihor Aleksandrov" userId="c3051032-6b87-4db2-b257-777a0106fbd9" providerId="ADAL" clId="{EA2B8A7D-3C52-4D81-9662-EF0FB964F7A9}" dt="2024-01-24T16:14:38.639" v="41" actId="14100"/>
-          <ac:spMkLst>
-            <pc:docMk/>
-            <pc:sldMk cId="1272792471" sldId="260"/>
-            <ac:spMk id="8" creationId="{962CACC9-F2FB-EAE2-C7FA-A5DDED1544E9}"/>
-          </ac:spMkLst>
-        </pc:spChg>
-        <pc:picChg chg="add mod">
-          <ac:chgData name="Ihor Aleksandrov" userId="c3051032-6b87-4db2-b257-777a0106fbd9" providerId="ADAL" clId="{EA2B8A7D-3C52-4D81-9662-EF0FB964F7A9}" dt="2024-01-24T16:14:21.159" v="36" actId="1076"/>
-          <ac:picMkLst>
-            <pc:docMk/>
-            <pc:sldMk cId="1272792471" sldId="260"/>
-            <ac:picMk id="3" creationId="{1546C464-6844-1963-9CFB-73B9F3FB02A1}"/>
-          </ac:picMkLst>
-        </pc:picChg>
-        <pc:picChg chg="del">
-          <ac:chgData name="Ihor Aleksandrov" userId="c3051032-6b87-4db2-b257-777a0106fbd9" providerId="ADAL" clId="{EA2B8A7D-3C52-4D81-9662-EF0FB964F7A9}" dt="2024-01-24T16:14:01.347" v="31" actId="478"/>
-          <ac:picMkLst>
-            <pc:docMk/>
-            <pc:sldMk cId="1272792471" sldId="260"/>
-            <ac:picMk id="4" creationId="{385F9644-E8EA-6C22-DF80-DC79BE06769D}"/>
-          </ac:picMkLst>
-        </pc:picChg>
-      </pc:sldChg>
-      <pc:sldChg chg="addSp delSp modSp add del mod setBg delDesignElem">
-        <pc:chgData name="Ihor Aleksandrov" userId="c3051032-6b87-4db2-b257-777a0106fbd9" providerId="ADAL" clId="{EA2B8A7D-3C52-4D81-9662-EF0FB964F7A9}" dt="2024-01-24T16:18:02.567" v="53" actId="1076"/>
-        <pc:sldMkLst>
-          <pc:docMk/>
-          <pc:sldMk cId="3278151509" sldId="261"/>
-        </pc:sldMkLst>
-        <pc:spChg chg="mod">
-          <ac:chgData name="Ihor Aleksandrov" userId="c3051032-6b87-4db2-b257-777a0106fbd9" providerId="ADAL" clId="{EA2B8A7D-3C52-4D81-9662-EF0FB964F7A9}" dt="2024-01-24T16:17:36.102" v="47" actId="26606"/>
-          <ac:spMkLst>
-            <pc:docMk/>
-            <pc:sldMk cId="3278151509" sldId="261"/>
-            <ac:spMk id="2" creationId="{53C5D828-9666-E312-B574-9FE965A7D6BE}"/>
-          </ac:spMkLst>
-        </pc:spChg>
-        <pc:spChg chg="add del">
-          <ac:chgData name="Ihor Aleksandrov" userId="c3051032-6b87-4db2-b257-777a0106fbd9" providerId="ADAL" clId="{EA2B8A7D-3C52-4D81-9662-EF0FB964F7A9}" dt="2024-01-24T16:17:57.899" v="51" actId="22"/>
-          <ac:spMkLst>
-            <pc:docMk/>
-            <pc:sldMk cId="3278151509" sldId="261"/>
-            <ac:spMk id="5" creationId="{80C09514-761F-EDD8-1695-BBF5A6E5D9C0}"/>
-          </ac:spMkLst>
-        </pc:spChg>
-        <pc:spChg chg="add mod">
-          <ac:chgData name="Ihor Aleksandrov" userId="c3051032-6b87-4db2-b257-777a0106fbd9" providerId="ADAL" clId="{EA2B8A7D-3C52-4D81-9662-EF0FB964F7A9}" dt="2024-01-24T16:18:02.567" v="53" actId="1076"/>
-          <ac:spMkLst>
-            <pc:docMk/>
-            <pc:sldMk cId="3278151509" sldId="261"/>
-            <ac:spMk id="7" creationId="{01126049-0F88-3BD5-09AE-A83AF81ABE26}"/>
-          </ac:spMkLst>
-        </pc:spChg>
-        <pc:spChg chg="add">
-          <ac:chgData name="Ihor Aleksandrov" userId="c3051032-6b87-4db2-b257-777a0106fbd9" providerId="ADAL" clId="{EA2B8A7D-3C52-4D81-9662-EF0FB964F7A9}" dt="2024-01-24T16:17:36.102" v="47" actId="26606"/>
-          <ac:spMkLst>
-            <pc:docMk/>
-            <pc:sldMk cId="3278151509" sldId="261"/>
-            <ac:spMk id="9" creationId="{D4771268-CB57-404A-9271-370EB28F6090}"/>
-          </ac:spMkLst>
-        </pc:spChg>
-        <pc:spChg chg="add del">
-          <ac:chgData name="Ihor Aleksandrov" userId="c3051032-6b87-4db2-b257-777a0106fbd9" providerId="ADAL" clId="{EA2B8A7D-3C52-4D81-9662-EF0FB964F7A9}" dt="2024-01-24T16:17:09.141" v="46"/>
-          <ac:spMkLst>
-            <pc:docMk/>
-            <pc:sldMk cId="3278151509" sldId="261"/>
-            <ac:spMk id="24" creationId="{D4771268-CB57-404A-9271-370EB28F6090}"/>
-          </ac:spMkLst>
-        </pc:spChg>
-        <pc:picChg chg="mod ord">
-          <ac:chgData name="Ihor Aleksandrov" userId="c3051032-6b87-4db2-b257-777a0106fbd9" providerId="ADAL" clId="{EA2B8A7D-3C52-4D81-9662-EF0FB964F7A9}" dt="2024-01-24T16:17:46.040" v="49" actId="1076"/>
-          <ac:picMkLst>
-            <pc:docMk/>
-            <pc:sldMk cId="3278151509" sldId="261"/>
-            <ac:picMk id="4" creationId="{110B72A2-37FD-3982-5358-333497678F76}"/>
-          </ac:picMkLst>
-        </pc:picChg>
-      </pc:sldChg>
-      <pc:sldChg chg="addSp delSp modSp add mod setBg delDesignElem">
-        <pc:chgData name="Ihor Aleksandrov" userId="c3051032-6b87-4db2-b257-777a0106fbd9" providerId="ADAL" clId="{EA2B8A7D-3C52-4D81-9662-EF0FB964F7A9}" dt="2024-01-24T16:20:59.581" v="66" actId="1076"/>
-        <pc:sldMkLst>
-          <pc:docMk/>
-          <pc:sldMk cId="3670086471" sldId="262"/>
-        </pc:sldMkLst>
-        <pc:spChg chg="mod">
-          <ac:chgData name="Ihor Aleksandrov" userId="c3051032-6b87-4db2-b257-777a0106fbd9" providerId="ADAL" clId="{EA2B8A7D-3C52-4D81-9662-EF0FB964F7A9}" dt="2024-01-24T16:20:22.633" v="56" actId="26606"/>
-          <ac:spMkLst>
-            <pc:docMk/>
-            <pc:sldMk cId="3670086471" sldId="262"/>
-            <ac:spMk id="2" creationId="{53C5D828-9666-E312-B574-9FE965A7D6BE}"/>
-          </ac:spMkLst>
-        </pc:spChg>
-        <pc:spChg chg="add del">
-          <ac:chgData name="Ihor Aleksandrov" userId="c3051032-6b87-4db2-b257-777a0106fbd9" providerId="ADAL" clId="{EA2B8A7D-3C52-4D81-9662-EF0FB964F7A9}" dt="2024-01-24T16:20:43.237" v="60" actId="22"/>
-          <ac:spMkLst>
-            <pc:docMk/>
-            <pc:sldMk cId="3670086471" sldId="262"/>
-            <ac:spMk id="5" creationId="{87F45561-879D-7670-C001-865486ED03AA}"/>
-          </ac:spMkLst>
-        </pc:spChg>
-        <pc:spChg chg="add mod">
-          <ac:chgData name="Ihor Aleksandrov" userId="c3051032-6b87-4db2-b257-777a0106fbd9" providerId="ADAL" clId="{EA2B8A7D-3C52-4D81-9662-EF0FB964F7A9}" dt="2024-01-24T16:20:59.581" v="66" actId="1076"/>
-          <ac:spMkLst>
-            <pc:docMk/>
-            <pc:sldMk cId="3670086471" sldId="262"/>
-            <ac:spMk id="7" creationId="{0C7CD13E-FC32-AC89-26A1-AF80634998A4}"/>
-          </ac:spMkLst>
-        </pc:spChg>
-        <pc:spChg chg="add">
-          <ac:chgData name="Ihor Aleksandrov" userId="c3051032-6b87-4db2-b257-777a0106fbd9" providerId="ADAL" clId="{EA2B8A7D-3C52-4D81-9662-EF0FB964F7A9}" dt="2024-01-24T16:20:22.633" v="56" actId="26606"/>
-          <ac:spMkLst>
-            <pc:docMk/>
-            <pc:sldMk cId="3670086471" sldId="262"/>
-            <ac:spMk id="8" creationId="{D4771268-CB57-404A-9271-370EB28F6090}"/>
-          </ac:spMkLst>
-        </pc:spChg>
-        <pc:spChg chg="del">
-          <ac:chgData name="Ihor Aleksandrov" userId="c3051032-6b87-4db2-b257-777a0106fbd9" providerId="ADAL" clId="{EA2B8A7D-3C52-4D81-9662-EF0FB964F7A9}" dt="2024-01-24T16:20:18.797" v="55"/>
-          <ac:spMkLst>
-            <pc:docMk/>
-            <pc:sldMk cId="3670086471" sldId="262"/>
-            <ac:spMk id="24" creationId="{D4771268-CB57-404A-9271-370EB28F6090}"/>
-          </ac:spMkLst>
-        </pc:spChg>
-        <pc:picChg chg="mod ord">
-          <ac:chgData name="Ihor Aleksandrov" userId="c3051032-6b87-4db2-b257-777a0106fbd9" providerId="ADAL" clId="{EA2B8A7D-3C52-4D81-9662-EF0FB964F7A9}" dt="2024-01-24T16:20:28.992" v="58" actId="1076"/>
-          <ac:picMkLst>
-            <pc:docMk/>
-            <pc:sldMk cId="3670086471" sldId="262"/>
-            <ac:picMk id="3" creationId="{05A9FF40-DCEC-8E82-7C4D-BDBC1FAB1FDA}"/>
-          </ac:picMkLst>
-        </pc:picChg>
-      </pc:sldChg>
-      <pc:sldChg chg="addSp delSp modSp add mod setBg delDesignElem">
-        <pc:chgData name="Ihor Aleksandrov" userId="c3051032-6b87-4db2-b257-777a0106fbd9" providerId="ADAL" clId="{EA2B8A7D-3C52-4D81-9662-EF0FB964F7A9}" dt="2024-01-24T16:23:06.581" v="73" actId="1076"/>
-        <pc:sldMkLst>
-          <pc:docMk/>
-          <pc:sldMk cId="2476824021" sldId="263"/>
-        </pc:sldMkLst>
-        <pc:spChg chg="mod">
-          <ac:chgData name="Ihor Aleksandrov" userId="c3051032-6b87-4db2-b257-777a0106fbd9" providerId="ADAL" clId="{EA2B8A7D-3C52-4D81-9662-EF0FB964F7A9}" dt="2024-01-24T16:22:47.826" v="69" actId="26606"/>
-          <ac:spMkLst>
-            <pc:docMk/>
-            <pc:sldMk cId="2476824021" sldId="263"/>
-            <ac:spMk id="2" creationId="{53C5D828-9666-E312-B574-9FE965A7D6BE}"/>
-          </ac:spMkLst>
-        </pc:spChg>
-        <pc:spChg chg="add mod">
-          <ac:chgData name="Ihor Aleksandrov" userId="c3051032-6b87-4db2-b257-777a0106fbd9" providerId="ADAL" clId="{EA2B8A7D-3C52-4D81-9662-EF0FB964F7A9}" dt="2024-01-24T16:23:06.581" v="73" actId="1076"/>
-          <ac:spMkLst>
-            <pc:docMk/>
-            <pc:sldMk cId="2476824021" sldId="263"/>
-            <ac:spMk id="5" creationId="{E202FD3D-76E9-4318-0828-6FB8B5DBD2C5}"/>
-          </ac:spMkLst>
-        </pc:spChg>
-        <pc:spChg chg="add">
-          <ac:chgData name="Ihor Aleksandrov" userId="c3051032-6b87-4db2-b257-777a0106fbd9" providerId="ADAL" clId="{EA2B8A7D-3C52-4D81-9662-EF0FB964F7A9}" dt="2024-01-24T16:22:47.826" v="69" actId="26606"/>
-          <ac:spMkLst>
-            <pc:docMk/>
-            <pc:sldMk cId="2476824021" sldId="263"/>
-            <ac:spMk id="9" creationId="{D4771268-CB57-404A-9271-370EB28F6090}"/>
-          </ac:spMkLst>
-        </pc:spChg>
-        <pc:spChg chg="del">
-          <ac:chgData name="Ihor Aleksandrov" userId="c3051032-6b87-4db2-b257-777a0106fbd9" providerId="ADAL" clId="{EA2B8A7D-3C52-4D81-9662-EF0FB964F7A9}" dt="2024-01-24T16:22:44.812" v="68"/>
-          <ac:spMkLst>
-            <pc:docMk/>
-            <pc:sldMk cId="2476824021" sldId="263"/>
-            <ac:spMk id="24" creationId="{D4771268-CB57-404A-9271-370EB28F6090}"/>
-          </ac:spMkLst>
-        </pc:spChg>
-        <pc:picChg chg="mod">
-          <ac:chgData name="Ihor Aleksandrov" userId="c3051032-6b87-4db2-b257-777a0106fbd9" providerId="ADAL" clId="{EA2B8A7D-3C52-4D81-9662-EF0FB964F7A9}" dt="2024-01-24T16:22:54.712" v="71" actId="1076"/>
-          <ac:picMkLst>
-            <pc:docMk/>
-            <pc:sldMk cId="2476824021" sldId="263"/>
-            <ac:picMk id="4" creationId="{0A4A47BB-B86E-CE6D-6738-81D9FF41289F}"/>
-          </ac:picMkLst>
-        </pc:picChg>
-      </pc:sldChg>
-      <pc:sldChg chg="addSp delSp modSp add del mod setBg delDesignElem">
-        <pc:chgData name="Ihor Aleksandrov" userId="c3051032-6b87-4db2-b257-777a0106fbd9" providerId="ADAL" clId="{EA2B8A7D-3C52-4D81-9662-EF0FB964F7A9}" dt="2024-01-24T16:26:03.232" v="79" actId="47"/>
-        <pc:sldMkLst>
-          <pc:docMk/>
-          <pc:sldMk cId="303933854" sldId="264"/>
-        </pc:sldMkLst>
-        <pc:spChg chg="mod">
-          <ac:chgData name="Ihor Aleksandrov" userId="c3051032-6b87-4db2-b257-777a0106fbd9" providerId="ADAL" clId="{EA2B8A7D-3C52-4D81-9662-EF0FB964F7A9}" dt="2024-01-24T16:25:24.035" v="76" actId="26606"/>
-          <ac:spMkLst>
-            <pc:docMk/>
-            <pc:sldMk cId="303933854" sldId="264"/>
-            <ac:spMk id="2" creationId="{53C5D828-9666-E312-B574-9FE965A7D6BE}"/>
-          </ac:spMkLst>
-        </pc:spChg>
-        <pc:spChg chg="add">
-          <ac:chgData name="Ihor Aleksandrov" userId="c3051032-6b87-4db2-b257-777a0106fbd9" providerId="ADAL" clId="{EA2B8A7D-3C52-4D81-9662-EF0FB964F7A9}" dt="2024-01-24T16:25:24.035" v="76" actId="26606"/>
-          <ac:spMkLst>
-            <pc:docMk/>
-            <pc:sldMk cId="303933854" sldId="264"/>
-            <ac:spMk id="10" creationId="{53F29798-D584-4792-9B62-3F5F5C36D619}"/>
-          </ac:spMkLst>
-        </pc:spChg>
-        <pc:spChg chg="del">
-          <ac:chgData name="Ihor Aleksandrov" userId="c3051032-6b87-4db2-b257-777a0106fbd9" providerId="ADAL" clId="{EA2B8A7D-3C52-4D81-9662-EF0FB964F7A9}" dt="2024-01-24T16:25:20.099" v="75"/>
-          <ac:spMkLst>
-            <pc:docMk/>
-            <pc:sldMk cId="303933854" sldId="264"/>
-            <ac:spMk id="24" creationId="{D4771268-CB57-404A-9271-370EB28F6090}"/>
-          </ac:spMkLst>
-        </pc:spChg>
-        <pc:picChg chg="mod">
-          <ac:chgData name="Ihor Aleksandrov" userId="c3051032-6b87-4db2-b257-777a0106fbd9" providerId="ADAL" clId="{EA2B8A7D-3C52-4D81-9662-EF0FB964F7A9}" dt="2024-01-24T16:25:24.035" v="76" actId="26606"/>
-          <ac:picMkLst>
-            <pc:docMk/>
-            <pc:sldMk cId="303933854" sldId="264"/>
-            <ac:picMk id="3" creationId="{438AE1ED-C17A-0BC4-8D21-4B49E9F91B9F}"/>
-          </ac:picMkLst>
-        </pc:picChg>
-        <pc:picChg chg="mod ord">
-          <ac:chgData name="Ihor Aleksandrov" userId="c3051032-6b87-4db2-b257-777a0106fbd9" providerId="ADAL" clId="{EA2B8A7D-3C52-4D81-9662-EF0FB964F7A9}" dt="2024-01-24T16:25:24.035" v="76" actId="26606"/>
-          <ac:picMkLst>
-            <pc:docMk/>
-            <pc:sldMk cId="303933854" sldId="264"/>
-            <ac:picMk id="5" creationId="{699631DD-6035-BB9F-11EC-4E9F01F1D081}"/>
-          </ac:picMkLst>
-        </pc:picChg>
-      </pc:sldChg>
-      <pc:sldChg chg="delSp add del mod setBg delDesignElem">
-        <pc:chgData name="Ihor Aleksandrov" userId="c3051032-6b87-4db2-b257-777a0106fbd9" providerId="ADAL" clId="{EA2B8A7D-3C52-4D81-9662-EF0FB964F7A9}" dt="2024-01-24T16:26:15.663" v="82" actId="2696"/>
-        <pc:sldMkLst>
-          <pc:docMk/>
-          <pc:sldMk cId="3329585973" sldId="265"/>
-        </pc:sldMkLst>
-        <pc:spChg chg="del">
-          <ac:chgData name="Ihor Aleksandrov" userId="c3051032-6b87-4db2-b257-777a0106fbd9" providerId="ADAL" clId="{EA2B8A7D-3C52-4D81-9662-EF0FB964F7A9}" dt="2024-01-24T16:25:53.024" v="78"/>
-          <ac:spMkLst>
-            <pc:docMk/>
-            <pc:sldMk cId="3329585973" sldId="265"/>
-            <ac:spMk id="24" creationId="{D4771268-CB57-404A-9271-370EB28F6090}"/>
-          </ac:spMkLst>
-        </pc:spChg>
-        <pc:picChg chg="del">
-          <ac:chgData name="Ihor Aleksandrov" userId="c3051032-6b87-4db2-b257-777a0106fbd9" providerId="ADAL" clId="{EA2B8A7D-3C52-4D81-9662-EF0FB964F7A9}" dt="2024-01-24T16:26:11.119" v="81" actId="21"/>
-          <ac:picMkLst>
-            <pc:docMk/>
-            <pc:sldMk cId="3329585973" sldId="265"/>
-            <ac:picMk id="3" creationId="{438AE1ED-C17A-0BC4-8D21-4B49E9F91B9F}"/>
-          </ac:picMkLst>
-        </pc:picChg>
-        <pc:picChg chg="del">
-          <ac:chgData name="Ihor Aleksandrov" userId="c3051032-6b87-4db2-b257-777a0106fbd9" providerId="ADAL" clId="{EA2B8A7D-3C52-4D81-9662-EF0FB964F7A9}" dt="2024-01-24T16:26:11.119" v="81" actId="21"/>
-          <ac:picMkLst>
-            <pc:docMk/>
-            <pc:sldMk cId="3329585973" sldId="265"/>
-            <ac:picMk id="5" creationId="{699631DD-6035-BB9F-11EC-4E9F01F1D081}"/>
-          </ac:picMkLst>
-        </pc:picChg>
-      </pc:sldChg>
-      <pc:sldChg chg="delSp add del mod setBg delDesignElem">
-        <pc:chgData name="Ihor Aleksandrov" userId="c3051032-6b87-4db2-b257-777a0106fbd9" providerId="ADAL" clId="{EA2B8A7D-3C52-4D81-9662-EF0FB964F7A9}" dt="2024-01-24T16:30:49.711" v="105" actId="47"/>
-        <pc:sldMkLst>
-          <pc:docMk/>
-          <pc:sldMk cId="3569579791" sldId="265"/>
-        </pc:sldMkLst>
-        <pc:spChg chg="del">
-          <ac:chgData name="Ihor Aleksandrov" userId="c3051032-6b87-4db2-b257-777a0106fbd9" providerId="ADAL" clId="{EA2B8A7D-3C52-4D81-9662-EF0FB964F7A9}" dt="2024-01-24T16:30:40.099" v="103" actId="478"/>
-          <ac:spMkLst>
-            <pc:docMk/>
-            <pc:sldMk cId="3569579791" sldId="265"/>
-            <ac:spMk id="6" creationId="{E04F08BD-B70E-B1A8-7328-EE29B18E4AA1}"/>
-          </ac:spMkLst>
-        </pc:spChg>
-        <pc:spChg chg="del">
-          <ac:chgData name="Ihor Aleksandrov" userId="c3051032-6b87-4db2-b257-777a0106fbd9" providerId="ADAL" clId="{EA2B8A7D-3C52-4D81-9662-EF0FB964F7A9}" dt="2024-01-24T16:30:26.607" v="102"/>
-          <ac:spMkLst>
-            <pc:docMk/>
-            <pc:sldMk cId="3569579791" sldId="265"/>
-            <ac:spMk id="24" creationId="{D4771268-CB57-404A-9271-370EB28F6090}"/>
-          </ac:spMkLst>
-        </pc:spChg>
-      </pc:sldChg>
-      <pc:sldChg chg="addSp delSp modSp add mod">
-        <pc:chgData name="Ihor Aleksandrov" userId="c3051032-6b87-4db2-b257-777a0106fbd9" providerId="ADAL" clId="{EA2B8A7D-3C52-4D81-9662-EF0FB964F7A9}" dt="2024-01-24T16:27:15.280" v="97"/>
-        <pc:sldMkLst>
-          <pc:docMk/>
-          <pc:sldMk cId="1454947672" sldId="266"/>
-        </pc:sldMkLst>
-        <pc:spChg chg="mod">
-          <ac:chgData name="Ihor Aleksandrov" userId="c3051032-6b87-4db2-b257-777a0106fbd9" providerId="ADAL" clId="{EA2B8A7D-3C52-4D81-9662-EF0FB964F7A9}" dt="2024-01-24T16:27:15.280" v="97"/>
-          <ac:spMkLst>
-            <pc:docMk/>
-            <pc:sldMk cId="1454947672" sldId="266"/>
-            <ac:spMk id="2" creationId="{53C5D828-9666-E312-B574-9FE965A7D6BE}"/>
-          </ac:spMkLst>
-        </pc:spChg>
-        <pc:spChg chg="del mod">
-          <ac:chgData name="Ihor Aleksandrov" userId="c3051032-6b87-4db2-b257-777a0106fbd9" providerId="ADAL" clId="{EA2B8A7D-3C52-4D81-9662-EF0FB964F7A9}" dt="2024-01-24T16:26:42.413" v="88" actId="478"/>
-          <ac:spMkLst>
-            <pc:docMk/>
-            <pc:sldMk cId="1454947672" sldId="266"/>
-            <ac:spMk id="5" creationId="{E202FD3D-76E9-4318-0828-6FB8B5DBD2C5}"/>
-          </ac:spMkLst>
-        </pc:spChg>
-        <pc:spChg chg="add del">
-          <ac:chgData name="Ihor Aleksandrov" userId="c3051032-6b87-4db2-b257-777a0106fbd9" providerId="ADAL" clId="{EA2B8A7D-3C52-4D81-9662-EF0FB964F7A9}" dt="2024-01-24T16:26:47.309" v="90" actId="22"/>
-          <ac:spMkLst>
-            <pc:docMk/>
-            <pc:sldMk cId="1454947672" sldId="266"/>
-            <ac:spMk id="7" creationId="{EBBF43C8-41E2-AE32-94D4-F581BEA6FE8A}"/>
-          </ac:spMkLst>
-        </pc:spChg>
-        <pc:spChg chg="add mod">
-          <ac:chgData name="Ihor Aleksandrov" userId="c3051032-6b87-4db2-b257-777a0106fbd9" providerId="ADAL" clId="{EA2B8A7D-3C52-4D81-9662-EF0FB964F7A9}" dt="2024-01-24T16:26:50.235" v="92" actId="1076"/>
-          <ac:spMkLst>
-            <pc:docMk/>
-            <pc:sldMk cId="1454947672" sldId="266"/>
-            <ac:spMk id="10" creationId="{876EA409-9CED-1530-7AE1-2CE040ED9572}"/>
-          </ac:spMkLst>
-        </pc:spChg>
-        <pc:spChg chg="add del">
-          <ac:chgData name="Ihor Aleksandrov" userId="c3051032-6b87-4db2-b257-777a0106fbd9" providerId="ADAL" clId="{EA2B8A7D-3C52-4D81-9662-EF0FB964F7A9}" dt="2024-01-24T16:27:03.773" v="94" actId="22"/>
-          <ac:spMkLst>
-            <pc:docMk/>
-            <pc:sldMk cId="1454947672" sldId="266"/>
-            <ac:spMk id="12" creationId="{B2D7BD0E-CC55-1DD1-5742-E58CD9EC1D9B}"/>
-          </ac:spMkLst>
-        </pc:spChg>
-        <pc:spChg chg="add mod">
-          <ac:chgData name="Ihor Aleksandrov" userId="c3051032-6b87-4db2-b257-777a0106fbd9" providerId="ADAL" clId="{EA2B8A7D-3C52-4D81-9662-EF0FB964F7A9}" dt="2024-01-24T16:27:06.948" v="96" actId="1076"/>
-          <ac:spMkLst>
-            <pc:docMk/>
-            <pc:sldMk cId="1454947672" sldId="266"/>
-            <ac:spMk id="14" creationId="{51860035-8393-B608-A571-9F2BF673BAF4}"/>
-          </ac:spMkLst>
-        </pc:spChg>
-        <pc:picChg chg="add mod">
-          <ac:chgData name="Ihor Aleksandrov" userId="c3051032-6b87-4db2-b257-777a0106fbd9" providerId="ADAL" clId="{EA2B8A7D-3C52-4D81-9662-EF0FB964F7A9}" dt="2024-01-24T16:26:30.403" v="86" actId="1076"/>
-          <ac:picMkLst>
-            <pc:docMk/>
-            <pc:sldMk cId="1454947672" sldId="266"/>
-            <ac:picMk id="3" creationId="{4E45773B-3762-41A2-A15B-67E57E13AFF0}"/>
-          </ac:picMkLst>
-        </pc:picChg>
-        <pc:picChg chg="del">
-          <ac:chgData name="Ihor Aleksandrov" userId="c3051032-6b87-4db2-b257-777a0106fbd9" providerId="ADAL" clId="{EA2B8A7D-3C52-4D81-9662-EF0FB964F7A9}" dt="2024-01-24T16:26:26.334" v="85" actId="478"/>
-          <ac:picMkLst>
-            <pc:docMk/>
-            <pc:sldMk cId="1454947672" sldId="266"/>
-            <ac:picMk id="4" creationId="{0A4A47BB-B86E-CE6D-6738-81D9FF41289F}"/>
-          </ac:picMkLst>
-        </pc:picChg>
-      </pc:sldChg>
-      <pc:sldChg chg="addSp delSp modSp add mod">
-        <pc:chgData name="Ihor Aleksandrov" userId="c3051032-6b87-4db2-b257-777a0106fbd9" providerId="ADAL" clId="{EA2B8A7D-3C52-4D81-9662-EF0FB964F7A9}" dt="2024-01-24T16:31:25.335" v="112" actId="1076"/>
-        <pc:sldMkLst>
-          <pc:docMk/>
-          <pc:sldMk cId="361920255" sldId="267"/>
-        </pc:sldMkLst>
-        <pc:spChg chg="mod">
-          <ac:chgData name="Ihor Aleksandrov" userId="c3051032-6b87-4db2-b257-777a0106fbd9" providerId="ADAL" clId="{EA2B8A7D-3C52-4D81-9662-EF0FB964F7A9}" dt="2024-01-24T16:31:13.857" v="110"/>
-          <ac:spMkLst>
-            <pc:docMk/>
-            <pc:sldMk cId="361920255" sldId="267"/>
-            <ac:spMk id="2" creationId="{53C5D828-9666-E312-B574-9FE965A7D6BE}"/>
-          </ac:spMkLst>
-        </pc:spChg>
-        <pc:spChg chg="add mod">
-          <ac:chgData name="Ihor Aleksandrov" userId="c3051032-6b87-4db2-b257-777a0106fbd9" providerId="ADAL" clId="{EA2B8A7D-3C52-4D81-9662-EF0FB964F7A9}" dt="2024-01-24T16:31:25.335" v="112" actId="1076"/>
-          <ac:spMkLst>
-            <pc:docMk/>
-            <pc:sldMk cId="361920255" sldId="267"/>
-            <ac:spMk id="5" creationId="{02856B1C-9D37-7B11-BA48-D0E2FC265F83}"/>
-          </ac:spMkLst>
-        </pc:spChg>
-        <pc:spChg chg="del mod">
-          <ac:chgData name="Ihor Aleksandrov" userId="c3051032-6b87-4db2-b257-777a0106fbd9" providerId="ADAL" clId="{EA2B8A7D-3C52-4D81-9662-EF0FB964F7A9}" dt="2024-01-24T16:30:58.832" v="107" actId="478"/>
-          <ac:spMkLst>
-            <pc:docMk/>
-            <pc:sldMk cId="361920255" sldId="267"/>
-            <ac:spMk id="10" creationId="{876EA409-9CED-1530-7AE1-2CE040ED9572}"/>
-          </ac:spMkLst>
-        </pc:spChg>
-        <pc:spChg chg="del">
-          <ac:chgData name="Ihor Aleksandrov" userId="c3051032-6b87-4db2-b257-777a0106fbd9" providerId="ADAL" clId="{EA2B8A7D-3C52-4D81-9662-EF0FB964F7A9}" dt="2024-01-24T16:31:00.543" v="108" actId="478"/>
-          <ac:spMkLst>
-            <pc:docMk/>
-            <pc:sldMk cId="361920255" sldId="267"/>
-            <ac:spMk id="14" creationId="{51860035-8393-B608-A571-9F2BF673BAF4}"/>
-          </ac:spMkLst>
-        </pc:spChg>
-        <pc:picChg chg="del">
-          <ac:chgData name="Ihor Aleksandrov" userId="c3051032-6b87-4db2-b257-777a0106fbd9" providerId="ADAL" clId="{EA2B8A7D-3C52-4D81-9662-EF0FB964F7A9}" dt="2024-01-24T16:31:01.377" v="109" actId="478"/>
-          <ac:picMkLst>
-            <pc:docMk/>
-            <pc:sldMk cId="361920255" sldId="267"/>
-            <ac:picMk id="3" creationId="{4E45773B-3762-41A2-A15B-67E57E13AFF0}"/>
-          </ac:picMkLst>
-        </pc:picChg>
-      </pc:sldChg>
-      <pc:sldChg chg="addSp delSp modSp add mod">
-        <pc:chgData name="Ihor Aleksandrov" userId="c3051032-6b87-4db2-b257-777a0106fbd9" providerId="ADAL" clId="{EA2B8A7D-3C52-4D81-9662-EF0FB964F7A9}" dt="2024-01-24T16:32:14.326" v="126" actId="1076"/>
-        <pc:sldMkLst>
-          <pc:docMk/>
-          <pc:sldMk cId="2161892916" sldId="268"/>
-        </pc:sldMkLst>
-        <pc:spChg chg="mod">
-          <ac:chgData name="Ihor Aleksandrov" userId="c3051032-6b87-4db2-b257-777a0106fbd9" providerId="ADAL" clId="{EA2B8A7D-3C52-4D81-9662-EF0FB964F7A9}" dt="2024-01-24T16:31:48.062" v="116"/>
-          <ac:spMkLst>
-            <pc:docMk/>
-            <pc:sldMk cId="2161892916" sldId="268"/>
-            <ac:spMk id="2" creationId="{53C5D828-9666-E312-B574-9FE965A7D6BE}"/>
-          </ac:spMkLst>
-        </pc:spChg>
-        <pc:spChg chg="add del mod">
-          <ac:chgData name="Ihor Aleksandrov" userId="c3051032-6b87-4db2-b257-777a0106fbd9" providerId="ADAL" clId="{EA2B8A7D-3C52-4D81-9662-EF0FB964F7A9}" dt="2024-01-24T16:32:05.265" v="122" actId="22"/>
-          <ac:spMkLst>
-            <pc:docMk/>
-            <pc:sldMk cId="2161892916" sldId="268"/>
-            <ac:spMk id="4" creationId="{B8915959-A3F5-CE1D-2197-4D202DD13295}"/>
-          </ac:spMkLst>
-        </pc:spChg>
-        <pc:spChg chg="del mod">
-          <ac:chgData name="Ihor Aleksandrov" userId="c3051032-6b87-4db2-b257-777a0106fbd9" providerId="ADAL" clId="{EA2B8A7D-3C52-4D81-9662-EF0FB964F7A9}" dt="2024-01-24T16:31:54.161" v="118" actId="478"/>
-          <ac:spMkLst>
-            <pc:docMk/>
-            <pc:sldMk cId="2161892916" sldId="268"/>
-            <ac:spMk id="5" creationId="{02856B1C-9D37-7B11-BA48-D0E2FC265F83}"/>
-          </ac:spMkLst>
-        </pc:spChg>
-        <pc:spChg chg="add del">
-          <ac:chgData name="Ihor Aleksandrov" userId="c3051032-6b87-4db2-b257-777a0106fbd9" providerId="ADAL" clId="{EA2B8A7D-3C52-4D81-9662-EF0FB964F7A9}" dt="2024-01-24T16:32:08.037" v="124" actId="22"/>
-          <ac:spMkLst>
-            <pc:docMk/>
-            <pc:sldMk cId="2161892916" sldId="268"/>
-            <ac:spMk id="7" creationId="{DCE8D0BA-A771-5143-4367-C42932080953}"/>
-          </ac:spMkLst>
-        </pc:spChg>
-        <pc:spChg chg="add mod">
-          <ac:chgData name="Ihor Aleksandrov" userId="c3051032-6b87-4db2-b257-777a0106fbd9" providerId="ADAL" clId="{EA2B8A7D-3C52-4D81-9662-EF0FB964F7A9}" dt="2024-01-24T16:32:14.326" v="126" actId="1076"/>
-          <ac:spMkLst>
-            <pc:docMk/>
-            <pc:sldMk cId="2161892916" sldId="268"/>
-            <ac:spMk id="10" creationId="{F24BEA27-D44B-2EE7-CAFE-869E74A5EAC6}"/>
-          </ac:spMkLst>
-        </pc:spChg>
-      </pc:sldChg>
-      <pc:sldChg chg="modSp add mod">
-        <pc:chgData name="Ihor Aleksandrov" userId="c3051032-6b87-4db2-b257-777a0106fbd9" providerId="ADAL" clId="{EA2B8A7D-3C52-4D81-9662-EF0FB964F7A9}" dt="2024-01-24T16:33:04.330" v="132" actId="1076"/>
-        <pc:sldMkLst>
-          <pc:docMk/>
-          <pc:sldMk cId="3157685417" sldId="269"/>
-        </pc:sldMkLst>
-        <pc:spChg chg="mod">
-          <ac:chgData name="Ihor Aleksandrov" userId="c3051032-6b87-4db2-b257-777a0106fbd9" providerId="ADAL" clId="{EA2B8A7D-3C52-4D81-9662-EF0FB964F7A9}" dt="2024-01-24T16:32:51.150" v="130"/>
-          <ac:spMkLst>
-            <pc:docMk/>
-            <pc:sldMk cId="3157685417" sldId="269"/>
-            <ac:spMk id="2" creationId="{53C5D828-9666-E312-B574-9FE965A7D6BE}"/>
-          </ac:spMkLst>
-        </pc:spChg>
-        <pc:spChg chg="mod">
-          <ac:chgData name="Ihor Aleksandrov" userId="c3051032-6b87-4db2-b257-777a0106fbd9" providerId="ADAL" clId="{EA2B8A7D-3C52-4D81-9662-EF0FB964F7A9}" dt="2024-01-24T16:33:04.330" v="132" actId="1076"/>
-          <ac:spMkLst>
-            <pc:docMk/>
-            <pc:sldMk cId="3157685417" sldId="269"/>
-            <ac:spMk id="10" creationId="{F24BEA27-D44B-2EE7-CAFE-869E74A5EAC6}"/>
-          </ac:spMkLst>
-        </pc:spChg>
-      </pc:sldChg>
-      <pc:sldMasterChg chg="add addSldLayout">
-        <pc:chgData name="Ihor Aleksandrov" userId="c3051032-6b87-4db2-b257-777a0106fbd9" providerId="ADAL" clId="{EA2B8A7D-3C52-4D81-9662-EF0FB964F7A9}" dt="2024-01-24T16:09:52.219" v="19" actId="27028"/>
-        <pc:sldMasterMkLst>
-          <pc:docMk/>
-          <pc:sldMasterMk cId="1579723609" sldId="2147483660"/>
-        </pc:sldMasterMkLst>
-        <pc:sldLayoutChg chg="add">
-          <pc:chgData name="Ihor Aleksandrov" userId="c3051032-6b87-4db2-b257-777a0106fbd9" providerId="ADAL" clId="{EA2B8A7D-3C52-4D81-9662-EF0FB964F7A9}" dt="2024-01-24T16:09:52.219" v="19" actId="27028"/>
-          <pc:sldLayoutMkLst>
-            <pc:docMk/>
-            <pc:sldMasterMk cId="1579723609" sldId="2147483660"/>
-            <pc:sldLayoutMk cId="1498987355" sldId="2147483662"/>
-          </pc:sldLayoutMkLst>
-        </pc:sldLayoutChg>
-      </pc:sldMasterChg>
     </pc:docChg>
   </pc:docChgLst>
 </pc:chgInfo>
@@ -5342,7 +5356,7 @@
         <a:p>
           <a:r>
             <a:rPr lang="en-US" dirty="0"/>
-            <a:t>CI/CD</a:t>
+            <a:t>GitHub DevOps</a:t>
           </a:r>
         </a:p>
       </dgm:t>
@@ -5376,6 +5390,49 @@
         </a:p>
       </dgm:t>
     </dgm:pt>
+    <dgm:pt modelId="{DAD70996-E23E-44CF-9496-9F225988824C}">
+      <dgm:prSet/>
+      <dgm:spPr/>
+      <dgm:t>
+        <a:bodyPr/>
+        <a:lstStyle/>
+        <a:p>
+          <a:r>
+            <a:rPr lang="en-US" dirty="0"/>
+            <a:t>Azure DevOps</a:t>
+          </a:r>
+        </a:p>
+      </dgm:t>
+      <dgm:extLst>
+        <a:ext uri="{E40237B7-FDA0-4F09-8148-C483321AD2D9}">
+          <dgm14:cNvPr xmlns:dgm14="http://schemas.microsoft.com/office/drawing/2010/diagram" id="0" name="">
+            <a:hlinkClick xmlns:r="http://schemas.openxmlformats.org/officeDocument/2006/relationships" r:id="rId2" action="ppaction://hlinksldjump"/>
+          </dgm14:cNvPr>
+        </a:ext>
+      </dgm:extLst>
+    </dgm:pt>
+    <dgm:pt modelId="{94137695-88CF-4EED-B255-FD5FCD575BB8}" type="parTrans" cxnId="{CC0AE570-E75F-4678-9CD9-E364B5C64E63}">
+      <dgm:prSet/>
+      <dgm:spPr/>
+      <dgm:t>
+        <a:bodyPr/>
+        <a:lstStyle/>
+        <a:p>
+          <a:endParaRPr lang="ru-UA"/>
+        </a:p>
+      </dgm:t>
+    </dgm:pt>
+    <dgm:pt modelId="{2B9B5814-8CE0-4BB9-8EDD-ACCF502F2C87}" type="sibTrans" cxnId="{CC0AE570-E75F-4678-9CD9-E364B5C64E63}">
+      <dgm:prSet/>
+      <dgm:spPr/>
+      <dgm:t>
+        <a:bodyPr/>
+        <a:lstStyle/>
+        <a:p>
+          <a:endParaRPr lang="ru-UA"/>
+        </a:p>
+      </dgm:t>
+    </dgm:pt>
     <dgm:pt modelId="{4FE4B1AC-A99B-45EC-AFA8-E510D59359ED}" type="pres">
       <dgm:prSet presAssocID="{1C600E66-A0CB-470F-8514-C91590285CB3}" presName="Name0" presStyleCnt="0">
         <dgm:presLayoutVars>
@@ -5391,7 +5448,24 @@
       <dgm:spPr/>
     </dgm:pt>
     <dgm:pt modelId="{938A66F9-A955-4384-A32F-5A244E92AC01}" type="pres">
-      <dgm:prSet presAssocID="{64E9ACE6-9AFD-4BBA-80CB-01DA1300E087}" presName="parentText" presStyleLbl="node1" presStyleIdx="0" presStyleCnt="1">
+      <dgm:prSet presAssocID="{64E9ACE6-9AFD-4BBA-80CB-01DA1300E087}" presName="parentText" presStyleLbl="node1" presStyleIdx="0" presStyleCnt="2">
+        <dgm:presLayoutVars>
+          <dgm:chMax val="1"/>
+          <dgm:bulletEnabled val="1"/>
+        </dgm:presLayoutVars>
+      </dgm:prSet>
+      <dgm:spPr/>
+    </dgm:pt>
+    <dgm:pt modelId="{FEEBB475-23F0-4EEC-8808-EA0736323CB5}" type="pres">
+      <dgm:prSet presAssocID="{7B2C8051-D046-465E-BB80-77D9BB7B38CD}" presName="sp" presStyleCnt="0"/>
+      <dgm:spPr/>
+    </dgm:pt>
+    <dgm:pt modelId="{B9D0CF47-F7D0-4572-8FF1-B0AC879FEFBD}" type="pres">
+      <dgm:prSet presAssocID="{DAD70996-E23E-44CF-9496-9F225988824C}" presName="linNode" presStyleCnt="0"/>
+      <dgm:spPr/>
+    </dgm:pt>
+    <dgm:pt modelId="{B4BF24B5-900B-4F0B-9034-BC92D079EFDD}" type="pres">
+      <dgm:prSet presAssocID="{DAD70996-E23E-44CF-9496-9F225988824C}" presName="parentText" presStyleLbl="node1" presStyleIdx="1" presStyleCnt="2">
         <dgm:presLayoutVars>
           <dgm:chMax val="1"/>
           <dgm:bulletEnabled val="1"/>
@@ -5402,10 +5476,15 @@
   </dgm:ptLst>
   <dgm:cxnLst>
     <dgm:cxn modelId="{B4E32220-B6E5-419F-85FB-810888F0627F}" type="presOf" srcId="{64E9ACE6-9AFD-4BBA-80CB-01DA1300E087}" destId="{938A66F9-A955-4384-A32F-5A244E92AC01}" srcOrd="0" destOrd="0" presId="urn:microsoft.com/office/officeart/2005/8/layout/vList5"/>
+    <dgm:cxn modelId="{FBADA732-B3AD-4BED-906C-C0BAB399D555}" type="presOf" srcId="{DAD70996-E23E-44CF-9496-9F225988824C}" destId="{B4BF24B5-900B-4F0B-9034-BC92D079EFDD}" srcOrd="0" destOrd="0" presId="urn:microsoft.com/office/officeart/2005/8/layout/vList5"/>
+    <dgm:cxn modelId="{CC0AE570-E75F-4678-9CD9-E364B5C64E63}" srcId="{1C600E66-A0CB-470F-8514-C91590285CB3}" destId="{DAD70996-E23E-44CF-9496-9F225988824C}" srcOrd="1" destOrd="0" parTransId="{94137695-88CF-4EED-B255-FD5FCD575BB8}" sibTransId="{2B9B5814-8CE0-4BB9-8EDD-ACCF502F2C87}"/>
     <dgm:cxn modelId="{C7C38DA0-CE59-4FEF-BFD1-6FDA69259313}" srcId="{1C600E66-A0CB-470F-8514-C91590285CB3}" destId="{64E9ACE6-9AFD-4BBA-80CB-01DA1300E087}" srcOrd="0" destOrd="0" parTransId="{FD0FAFBC-EEAF-4FBF-916F-D182FE250A26}" sibTransId="{7B2C8051-D046-465E-BB80-77D9BB7B38CD}"/>
     <dgm:cxn modelId="{C92152C9-FF79-4894-84FC-66E915F78959}" type="presOf" srcId="{1C600E66-A0CB-470F-8514-C91590285CB3}" destId="{4FE4B1AC-A99B-45EC-AFA8-E510D59359ED}" srcOrd="0" destOrd="0" presId="urn:microsoft.com/office/officeart/2005/8/layout/vList5"/>
     <dgm:cxn modelId="{83CB446D-F423-469F-BA03-5D05F0C13392}" type="presParOf" srcId="{4FE4B1AC-A99B-45EC-AFA8-E510D59359ED}" destId="{025ACBAF-46AC-4624-83DD-68FF5F6C7CAC}" srcOrd="0" destOrd="0" presId="urn:microsoft.com/office/officeart/2005/8/layout/vList5"/>
     <dgm:cxn modelId="{63EE6CDD-CD71-4C1F-8B53-41E7553C7928}" type="presParOf" srcId="{025ACBAF-46AC-4624-83DD-68FF5F6C7CAC}" destId="{938A66F9-A955-4384-A32F-5A244E92AC01}" srcOrd="0" destOrd="0" presId="urn:microsoft.com/office/officeart/2005/8/layout/vList5"/>
+    <dgm:cxn modelId="{7BCDEA48-C0F6-4F07-A07B-1BEE0525B3F7}" type="presParOf" srcId="{4FE4B1AC-A99B-45EC-AFA8-E510D59359ED}" destId="{FEEBB475-23F0-4EEC-8808-EA0736323CB5}" srcOrd="1" destOrd="0" presId="urn:microsoft.com/office/officeart/2005/8/layout/vList5"/>
+    <dgm:cxn modelId="{887B3CE1-C4E9-4D9A-B562-5B3DEDF88E53}" type="presParOf" srcId="{4FE4B1AC-A99B-45EC-AFA8-E510D59359ED}" destId="{B9D0CF47-F7D0-4572-8FF1-B0AC879FEFBD}" srcOrd="2" destOrd="0" presId="urn:microsoft.com/office/officeart/2005/8/layout/vList5"/>
+    <dgm:cxn modelId="{12D6CF28-8297-4E1C-8C7F-71F47F5ACA82}" type="presParOf" srcId="{B9D0CF47-F7D0-4572-8FF1-B0AC879FEFBD}" destId="{B4BF24B5-900B-4F0B-9034-BC92D079EFDD}" srcOrd="0" destOrd="0" presId="urn:microsoft.com/office/officeart/2005/8/layout/vList5"/>
   </dgm:cxnLst>
   <dgm:bg/>
   <dgm:whole/>
@@ -5432,8 +5511,8 @@
       </dsp:nvSpPr>
       <dsp:spPr>
         <a:xfrm>
-          <a:off x="2044999" y="0"/>
-          <a:ext cx="2300624" cy="1526770"/>
+          <a:off x="2044999" y="39"/>
+          <a:ext cx="2300624" cy="1572621"/>
         </a:xfrm>
         <a:prstGeom prst="roundRect">
           <a:avLst/>
@@ -5475,12 +5554,12 @@
         </a:fontRef>
       </dsp:style>
       <dsp:txBody>
-        <a:bodyPr spcFirstLastPara="0" vert="horz" wrap="square" lIns="220980" tIns="110490" rIns="220980" bIns="110490" numCol="1" spcCol="1270" anchor="ctr" anchorCtr="0">
+        <a:bodyPr spcFirstLastPara="0" vert="horz" wrap="square" lIns="163830" tIns="81915" rIns="163830" bIns="81915" numCol="1" spcCol="1270" anchor="ctr" anchorCtr="0">
           <a:noAutofit/>
         </a:bodyPr>
         <a:lstStyle/>
         <a:p>
-          <a:pPr marL="0" lvl="0" indent="0" algn="ctr" defTabSz="2578100">
+          <a:pPr marL="0" lvl="0" indent="0" algn="ctr" defTabSz="1911350">
             <a:lnSpc>
               <a:spcPct val="90000"/>
             </a:lnSpc>
@@ -5493,14 +5572,92 @@
             <a:buNone/>
           </a:pPr>
           <a:r>
-            <a:rPr lang="en-US" sz="5800" kern="1200" dirty="0"/>
-            <a:t>CI/CD</a:t>
+            <a:rPr lang="en-US" sz="4300" kern="1200" dirty="0"/>
+            <a:t>GitHub DevOps</a:t>
           </a:r>
         </a:p>
       </dsp:txBody>
       <dsp:txXfrm>
-        <a:off x="2119530" y="74531"/>
-        <a:ext cx="2151562" cy="1377708"/>
+        <a:off x="2121768" y="76808"/>
+        <a:ext cx="2147086" cy="1419083"/>
+      </dsp:txXfrm>
+    </dsp:sp>
+    <dsp:sp modelId="{B4BF24B5-900B-4F0B-9034-BC92D079EFDD}">
+      <dsp:nvSpPr>
+        <dsp:cNvPr id="0" name=""/>
+        <dsp:cNvSpPr/>
+      </dsp:nvSpPr>
+      <dsp:spPr>
+        <a:xfrm>
+          <a:off x="2044999" y="1651292"/>
+          <a:ext cx="2300624" cy="1572621"/>
+        </a:xfrm>
+        <a:prstGeom prst="roundRect">
+          <a:avLst/>
+        </a:prstGeom>
+        <a:solidFill>
+          <a:schemeClr val="accent1">
+            <a:hueOff val="0"/>
+            <a:satOff val="0"/>
+            <a:lumOff val="0"/>
+            <a:alphaOff val="0"/>
+          </a:schemeClr>
+        </a:solidFill>
+        <a:ln w="12700" cap="flat" cmpd="sng" algn="ctr">
+          <a:solidFill>
+            <a:schemeClr val="lt1">
+              <a:hueOff val="0"/>
+              <a:satOff val="0"/>
+              <a:lumOff val="0"/>
+              <a:alphaOff val="0"/>
+            </a:schemeClr>
+          </a:solidFill>
+          <a:prstDash val="solid"/>
+          <a:miter lim="800000"/>
+        </a:ln>
+        <a:effectLst/>
+      </dsp:spPr>
+      <dsp:style>
+        <a:lnRef idx="2">
+          <a:scrgbClr r="0" g="0" b="0"/>
+        </a:lnRef>
+        <a:fillRef idx="1">
+          <a:scrgbClr r="0" g="0" b="0"/>
+        </a:fillRef>
+        <a:effectRef idx="0">
+          <a:scrgbClr r="0" g="0" b="0"/>
+        </a:effectRef>
+        <a:fontRef idx="minor">
+          <a:schemeClr val="lt1"/>
+        </a:fontRef>
+      </dsp:style>
+      <dsp:txBody>
+        <a:bodyPr spcFirstLastPara="0" vert="horz" wrap="square" lIns="163830" tIns="81915" rIns="163830" bIns="81915" numCol="1" spcCol="1270" anchor="ctr" anchorCtr="0">
+          <a:noAutofit/>
+        </a:bodyPr>
+        <a:lstStyle/>
+        <a:p>
+          <a:pPr marL="0" lvl="0" indent="0" algn="ctr" defTabSz="1911350">
+            <a:lnSpc>
+              <a:spcPct val="90000"/>
+            </a:lnSpc>
+            <a:spcBef>
+              <a:spcPct val="0"/>
+            </a:spcBef>
+            <a:spcAft>
+              <a:spcPct val="35000"/>
+            </a:spcAft>
+            <a:buNone/>
+          </a:pPr>
+          <a:r>
+            <a:rPr lang="en-US" sz="4300" kern="1200" dirty="0"/>
+            <a:t>Azure DevOps</a:t>
+          </a:r>
+        </a:p>
+      </dsp:txBody>
+      <dsp:txXfrm>
+        <a:off x="2121768" y="1728061"/>
+        <a:ext cx="2147086" cy="1419083"/>
       </dsp:txXfrm>
     </dsp:sp>
   </dsp:spTree>
@@ -6856,7 +7013,7 @@
           <a:p>
             <a:fld id="{EABA3F4B-EFF6-45E3-A6AB-4944039E81EC}" type="datetimeFigureOut">
               <a:rPr lang="ru-UA" smtClean="0"/>
-              <a:t>26.01.2024</a:t>
+              <a:t>30.01.2024</a:t>
             </a:fld>
             <a:endParaRPr lang="ru-UA"/>
           </a:p>
@@ -7273,7 +7430,7 @@
           <a:p>
             <a:fld id="{C75B975F-BA21-4E1C-99B6-ABED30F89540}" type="datetime1">
               <a:rPr lang="ru-UA" smtClean="0"/>
-              <a:t>26.01.2024</a:t>
+              <a:t>30.01.2024</a:t>
             </a:fld>
             <a:endParaRPr lang="ru-UA"/>
           </a:p>
@@ -7477,7 +7634,7 @@
           <a:p>
             <a:fld id="{D66328E5-C855-4166-8AD5-040012BE18D2}" type="datetime1">
               <a:rPr lang="ru-UA" smtClean="0"/>
-              <a:t>26.01.2024</a:t>
+              <a:t>30.01.2024</a:t>
             </a:fld>
             <a:endParaRPr lang="ru-UA"/>
           </a:p>
@@ -7691,7 +7848,7 @@
           <a:p>
             <a:fld id="{84DAB8F6-F46E-4246-80EF-DE02354418E7}" type="datetime1">
               <a:rPr lang="ru-UA" smtClean="0"/>
-              <a:t>26.01.2024</a:t>
+              <a:t>30.01.2024</a:t>
             </a:fld>
             <a:endParaRPr lang="ru-UA"/>
           </a:p>
@@ -7895,7 +8052,7 @@
           <a:p>
             <a:fld id="{8467C913-2051-48A1-86F2-D1DABB2E6F13}" type="datetime1">
               <a:rPr lang="ru-UA" smtClean="0"/>
-              <a:t>26.01.2024</a:t>
+              <a:t>30.01.2024</a:t>
             </a:fld>
             <a:endParaRPr lang="ru-UA"/>
           </a:p>
@@ -8175,7 +8332,7 @@
           <a:p>
             <a:fld id="{4343B6D0-012B-4BC7-8612-51CB74638584}" type="datetime1">
               <a:rPr lang="ru-UA" smtClean="0"/>
-              <a:t>26.01.2024</a:t>
+              <a:t>30.01.2024</a:t>
             </a:fld>
             <a:endParaRPr lang="ru-UA"/>
           </a:p>
@@ -8447,7 +8604,7 @@
           <a:p>
             <a:fld id="{DA3001A2-AE52-4B99-AC5B-08EC45DA8AD0}" type="datetime1">
               <a:rPr lang="ru-UA" smtClean="0"/>
-              <a:t>26.01.2024</a:t>
+              <a:t>30.01.2024</a:t>
             </a:fld>
             <a:endParaRPr lang="ru-UA"/>
           </a:p>
@@ -8866,7 +9023,7 @@
           <a:p>
             <a:fld id="{A27ADE6B-13FE-4183-AA7E-A7D12E19AD4E}" type="datetime1">
               <a:rPr lang="ru-UA" smtClean="0"/>
-              <a:t>26.01.2024</a:t>
+              <a:t>30.01.2024</a:t>
             </a:fld>
             <a:endParaRPr lang="ru-UA"/>
           </a:p>
@@ -9012,7 +9169,7 @@
           <a:p>
             <a:fld id="{F2FE09EF-E9B0-47B3-A956-B1218ACEB757}" type="datetime1">
               <a:rPr lang="ru-UA" smtClean="0"/>
-              <a:t>26.01.2024</a:t>
+              <a:t>30.01.2024</a:t>
             </a:fld>
             <a:endParaRPr lang="ru-UA"/>
           </a:p>
@@ -9129,7 +9286,7 @@
           <a:p>
             <a:fld id="{7C0BA055-DA58-45E6-8246-829A0C23A93B}" type="datetime1">
               <a:rPr lang="ru-UA" smtClean="0"/>
-              <a:t>26.01.2024</a:t>
+              <a:t>30.01.2024</a:t>
             </a:fld>
             <a:endParaRPr lang="ru-UA"/>
           </a:p>
@@ -9446,7 +9603,7 @@
           <a:p>
             <a:fld id="{6AED41DF-758F-4A6C-8E37-CA28871B2E5A}" type="datetime1">
               <a:rPr lang="ru-UA" smtClean="0"/>
-              <a:t>26.01.2024</a:t>
+              <a:t>30.01.2024</a:t>
             </a:fld>
             <a:endParaRPr lang="ru-UA"/>
           </a:p>
@@ -9739,7 +9896,7 @@
           <a:p>
             <a:fld id="{B092880E-860C-4927-A378-BCF65DB089C9}" type="datetime1">
               <a:rPr lang="ru-UA" smtClean="0"/>
-              <a:t>26.01.2024</a:t>
+              <a:t>30.01.2024</a:t>
             </a:fld>
             <a:endParaRPr lang="ru-UA"/>
           </a:p>
@@ -9986,7 +10143,7 @@
           <a:p>
             <a:fld id="{50344D1B-5235-486F-A999-CD74520911B6}" type="datetime1">
               <a:rPr lang="ru-UA" smtClean="0"/>
-              <a:t>26.01.2024</a:t>
+              <a:t>30.01.2024</a:t>
             </a:fld>
             <a:endParaRPr lang="ru-UA"/>
           </a:p>
@@ -13970,14 +14127,14 @@
           <p:nvPr>
             <p:extLst>
               <p:ext uri="{D42A27DB-BD31-4B8C-83A1-F6EECF244321}">
-                <p14:modId xmlns:p14="http://schemas.microsoft.com/office/powerpoint/2010/main" val="3992486113"/>
+                <p14:modId xmlns:p14="http://schemas.microsoft.com/office/powerpoint/2010/main" val="328349157"/>
               </p:ext>
             </p:extLst>
           </p:nvPr>
         </p:nvGraphicFramePr>
         <p:xfrm>
-          <a:off x="4654732" y="2664229"/>
-          <a:ext cx="6390623" cy="1526770"/>
+          <a:off x="4644525" y="2013065"/>
+          <a:ext cx="6390623" cy="3223953"/>
         </p:xfrm>
         <a:graphic>
           <a:graphicData uri="http://schemas.openxmlformats.org/drawingml/2006/diagram">

</xml_diff>